<commit_message>
Clean up slides for Processes session
This commit cleans up the slides for Processes session. Changes are
limited to syntactical and layout changes. Content is mostly unchanged.
</commit_message>
<xml_diff>
--- a/0-processes/0-Processes.pptx
+++ b/0-processes/0-Processes.pptx
@@ -5,18 +5,18 @@
     <p:sldMasterId id="2147483660" r:id="rId1"/>
   </p:sldMasterIdLst>
   <p:notesMasterIdLst>
-    <p:notesMasterId r:id="rId23"/>
+    <p:notesMasterId r:id="rId24"/>
   </p:notesMasterIdLst>
   <p:sldIdLst>
     <p:sldId id="256" r:id="rId2"/>
     <p:sldId id="257" r:id="rId3"/>
     <p:sldId id="258" r:id="rId4"/>
     <p:sldId id="259" r:id="rId5"/>
-    <p:sldId id="260" r:id="rId6"/>
-    <p:sldId id="261" r:id="rId7"/>
-    <p:sldId id="263" r:id="rId8"/>
-    <p:sldId id="264" r:id="rId9"/>
-    <p:sldId id="265" r:id="rId10"/>
+    <p:sldId id="261" r:id="rId6"/>
+    <p:sldId id="264" r:id="rId7"/>
+    <p:sldId id="265" r:id="rId8"/>
+    <p:sldId id="260" r:id="rId9"/>
+    <p:sldId id="263" r:id="rId10"/>
     <p:sldId id="266" r:id="rId11"/>
     <p:sldId id="276" r:id="rId12"/>
     <p:sldId id="267" r:id="rId13"/>
@@ -29,6 +29,7 @@
     <p:sldId id="278" r:id="rId20"/>
     <p:sldId id="277" r:id="rId21"/>
     <p:sldId id="275" r:id="rId22"/>
+    <p:sldId id="279" r:id="rId23"/>
   </p:sldIdLst>
   <p:sldSz cx="12192000" cy="6858000"/>
   <p:notesSz cx="6858000" cy="9144000"/>
@@ -136,15 +137,15 @@
             <p14:sldId id="257"/>
             <p14:sldId id="258"/>
             <p14:sldId id="259"/>
-            <p14:sldId id="260"/>
           </p14:sldIdLst>
         </p14:section>
         <p14:section name="Process Modern View" id="{A169E0D0-B884-5645-9AF6-EE51AEFB7F67}">
           <p14:sldIdLst>
             <p14:sldId id="261"/>
-            <p14:sldId id="263"/>
             <p14:sldId id="264"/>
             <p14:sldId id="265"/>
+            <p14:sldId id="260"/>
+            <p14:sldId id="263"/>
             <p14:sldId id="266"/>
             <p14:sldId id="276"/>
             <p14:sldId id="267"/>
@@ -161,6 +162,7 @@
             <p14:sldId id="278"/>
             <p14:sldId id="277"/>
             <p14:sldId id="275"/>
+            <p14:sldId id="279"/>
           </p14:sldIdLst>
         </p14:section>
       </p14:sectionLst>
@@ -170,14 +172,6 @@
     </p:ext>
   </p:extLst>
 </p:presentation>
-</file>
-
-<file path=ppt/revisionInfo.xml><?xml version="1.0" encoding="utf-8"?>
-<p1510:revInfo xmlns:a="http://schemas.openxmlformats.org/drawingml/2006/main" xmlns:r="http://schemas.openxmlformats.org/officeDocument/2006/relationships" xmlns:p1510="http://schemas.microsoft.com/office/powerpoint/2015/10/main">
-  <p1510:revLst>
-    <p1510:client id="{E2896B0F-748E-8740-8789-0130DEB7AFF0}" v="44" dt="2021-10-24T18:07:57.691"/>
-  </p1510:revLst>
-</p1510:revInfo>
 </file>
 
 <file path=ppt/changesInfos/changesInfo1.xml><?xml version="1.0" encoding="utf-8"?>
@@ -1913,6 +1907,378 @@
             <pc:docMk/>
             <pc:sldMk cId="1471021771" sldId="278"/>
             <ac:spMk id="3" creationId="{868BFB9C-33C1-A043-B0FC-006E9C81D0C6}"/>
+          </ac:spMkLst>
+        </pc:spChg>
+      </pc:sldChg>
+    </pc:docChg>
+  </pc:docChgLst>
+  <pc:docChgLst>
+    <pc:chgData name="Khaled Henidak (KAL)" userId="afa32885-6881-4d74-93e5-2f713e8c2558" providerId="ADAL" clId="{5A9E4669-AE38-924A-8641-4841E83F8B36}"/>
+    <pc:docChg chg="undo custSel addSld delSld modSld modSection">
+      <pc:chgData name="Khaled Henidak (KAL)" userId="afa32885-6881-4d74-93e5-2f713e8c2558" providerId="ADAL" clId="{5A9E4669-AE38-924A-8641-4841E83F8B36}" dt="2023-06-05T13:38:05.717" v="1598" actId="20577"/>
+      <pc:docMkLst>
+        <pc:docMk/>
+      </pc:docMkLst>
+      <pc:sldChg chg="modSp mod">
+        <pc:chgData name="Khaled Henidak (KAL)" userId="afa32885-6881-4d74-93e5-2f713e8c2558" providerId="ADAL" clId="{5A9E4669-AE38-924A-8641-4841E83F8B36}" dt="2023-06-04T15:21:59.346" v="0" actId="20577"/>
+        <pc:sldMkLst>
+          <pc:docMk/>
+          <pc:sldMk cId="109857222" sldId="256"/>
+        </pc:sldMkLst>
+        <pc:spChg chg="mod">
+          <ac:chgData name="Khaled Henidak (KAL)" userId="afa32885-6881-4d74-93e5-2f713e8c2558" providerId="ADAL" clId="{5A9E4669-AE38-924A-8641-4841E83F8B36}" dt="2023-06-04T15:21:59.346" v="0" actId="20577"/>
+          <ac:spMkLst>
+            <pc:docMk/>
+            <pc:sldMk cId="109857222" sldId="256"/>
+            <ac:spMk id="4" creationId="{A9EA6A51-823A-DF41-9E97-07CAC04770B4}"/>
+          </ac:spMkLst>
+        </pc:spChg>
+      </pc:sldChg>
+      <pc:sldChg chg="modSp mod">
+        <pc:chgData name="Khaled Henidak (KAL)" userId="afa32885-6881-4d74-93e5-2f713e8c2558" providerId="ADAL" clId="{5A9E4669-AE38-924A-8641-4841E83F8B36}" dt="2023-06-04T15:23:11.072" v="7" actId="33524"/>
+        <pc:sldMkLst>
+          <pc:docMk/>
+          <pc:sldMk cId="1109967106" sldId="258"/>
+        </pc:sldMkLst>
+        <pc:spChg chg="mod">
+          <ac:chgData name="Khaled Henidak (KAL)" userId="afa32885-6881-4d74-93e5-2f713e8c2558" providerId="ADAL" clId="{5A9E4669-AE38-924A-8641-4841E83F8B36}" dt="2023-06-04T15:23:11.072" v="7" actId="33524"/>
+          <ac:spMkLst>
+            <pc:docMk/>
+            <pc:sldMk cId="1109967106" sldId="258"/>
+            <ac:spMk id="7" creationId="{01EBDD20-F47D-D54B-ABD0-F181DE71A8E4}"/>
+          </ac:spMkLst>
+        </pc:spChg>
+      </pc:sldChg>
+      <pc:sldChg chg="modSp mod">
+        <pc:chgData name="Khaled Henidak (KAL)" userId="afa32885-6881-4d74-93e5-2f713e8c2558" providerId="ADAL" clId="{5A9E4669-AE38-924A-8641-4841E83F8B36}" dt="2023-06-05T13:38:05.717" v="1598" actId="20577"/>
+        <pc:sldMkLst>
+          <pc:docMk/>
+          <pc:sldMk cId="839801836" sldId="260"/>
+        </pc:sldMkLst>
+        <pc:spChg chg="mod">
+          <ac:chgData name="Khaled Henidak (KAL)" userId="afa32885-6881-4d74-93e5-2f713e8c2558" providerId="ADAL" clId="{5A9E4669-AE38-924A-8641-4841E83F8B36}" dt="2023-06-05T13:38:05.717" v="1598" actId="20577"/>
+          <ac:spMkLst>
+            <pc:docMk/>
+            <pc:sldMk cId="839801836" sldId="260"/>
+            <ac:spMk id="5" creationId="{3312133F-93C1-ED43-8673-E43AE7379D55}"/>
+          </ac:spMkLst>
+        </pc:spChg>
+      </pc:sldChg>
+      <pc:sldChg chg="modSp mod">
+        <pc:chgData name="Khaled Henidak (KAL)" userId="afa32885-6881-4d74-93e5-2f713e8c2558" providerId="ADAL" clId="{5A9E4669-AE38-924A-8641-4841E83F8B36}" dt="2023-06-04T15:31:04.770" v="35" actId="20577"/>
+        <pc:sldMkLst>
+          <pc:docMk/>
+          <pc:sldMk cId="3357472567" sldId="263"/>
+        </pc:sldMkLst>
+        <pc:spChg chg="mod">
+          <ac:chgData name="Khaled Henidak (KAL)" userId="afa32885-6881-4d74-93e5-2f713e8c2558" providerId="ADAL" clId="{5A9E4669-AE38-924A-8641-4841E83F8B36}" dt="2023-06-04T15:31:04.770" v="35" actId="20577"/>
+          <ac:spMkLst>
+            <pc:docMk/>
+            <pc:sldMk cId="3357472567" sldId="263"/>
+            <ac:spMk id="3" creationId="{B2552CD2-3AE2-4C42-8429-42ABE27082EE}"/>
+          </ac:spMkLst>
+        </pc:spChg>
+      </pc:sldChg>
+      <pc:sldChg chg="modSp mod">
+        <pc:chgData name="Khaled Henidak (KAL)" userId="afa32885-6881-4d74-93e5-2f713e8c2558" providerId="ADAL" clId="{5A9E4669-AE38-924A-8641-4841E83F8B36}" dt="2023-06-04T15:35:11.957" v="40" actId="20577"/>
+        <pc:sldMkLst>
+          <pc:docMk/>
+          <pc:sldMk cId="594650539" sldId="264"/>
+        </pc:sldMkLst>
+        <pc:spChg chg="mod">
+          <ac:chgData name="Khaled Henidak (KAL)" userId="afa32885-6881-4d74-93e5-2f713e8c2558" providerId="ADAL" clId="{5A9E4669-AE38-924A-8641-4841E83F8B36}" dt="2023-06-04T15:35:11.957" v="40" actId="20577"/>
+          <ac:spMkLst>
+            <pc:docMk/>
+            <pc:sldMk cId="594650539" sldId="264"/>
+            <ac:spMk id="3" creationId="{EF30EEED-1D57-654E-B68C-C5CE123BC312}"/>
+          </ac:spMkLst>
+        </pc:spChg>
+      </pc:sldChg>
+      <pc:sldChg chg="modSp mod">
+        <pc:chgData name="Khaled Henidak (KAL)" userId="afa32885-6881-4d74-93e5-2f713e8c2558" providerId="ADAL" clId="{5A9E4669-AE38-924A-8641-4841E83F8B36}" dt="2023-06-04T16:04:28.328" v="1565" actId="20577"/>
+        <pc:sldMkLst>
+          <pc:docMk/>
+          <pc:sldMk cId="61261275" sldId="266"/>
+        </pc:sldMkLst>
+        <pc:spChg chg="mod">
+          <ac:chgData name="Khaled Henidak (KAL)" userId="afa32885-6881-4d74-93e5-2f713e8c2558" providerId="ADAL" clId="{5A9E4669-AE38-924A-8641-4841E83F8B36}" dt="2023-06-04T16:00:38.167" v="992" actId="14100"/>
+          <ac:spMkLst>
+            <pc:docMk/>
+            <pc:sldMk cId="61261275" sldId="266"/>
+            <ac:spMk id="2" creationId="{A9E6DE50-98EA-4A4A-952C-B30D7EC7E473}"/>
+          </ac:spMkLst>
+        </pc:spChg>
+        <pc:spChg chg="mod">
+          <ac:chgData name="Khaled Henidak (KAL)" userId="afa32885-6881-4d74-93e5-2f713e8c2558" providerId="ADAL" clId="{5A9E4669-AE38-924A-8641-4841E83F8B36}" dt="2023-06-04T16:04:28.328" v="1565" actId="20577"/>
+          <ac:spMkLst>
+            <pc:docMk/>
+            <pc:sldMk cId="61261275" sldId="266"/>
+            <ac:spMk id="9" creationId="{A1669082-D5BA-0D4B-B7FC-7785E6F304D4}"/>
+          </ac:spMkLst>
+        </pc:spChg>
+      </pc:sldChg>
+      <pc:sldChg chg="modSp mod">
+        <pc:chgData name="Khaled Henidak (KAL)" userId="afa32885-6881-4d74-93e5-2f713e8c2558" providerId="ADAL" clId="{5A9E4669-AE38-924A-8641-4841E83F8B36}" dt="2023-06-04T15:39:41.965" v="123" actId="20577"/>
+        <pc:sldMkLst>
+          <pc:docMk/>
+          <pc:sldMk cId="1918080260" sldId="267"/>
+        </pc:sldMkLst>
+        <pc:spChg chg="mod">
+          <ac:chgData name="Khaled Henidak (KAL)" userId="afa32885-6881-4d74-93e5-2f713e8c2558" providerId="ADAL" clId="{5A9E4669-AE38-924A-8641-4841E83F8B36}" dt="2023-06-04T15:39:41.965" v="123" actId="20577"/>
+          <ac:spMkLst>
+            <pc:docMk/>
+            <pc:sldMk cId="1918080260" sldId="267"/>
+            <ac:spMk id="3" creationId="{B2552CD2-3AE2-4C42-8429-42ABE27082EE}"/>
+          </ac:spMkLst>
+        </pc:spChg>
+      </pc:sldChg>
+      <pc:sldChg chg="modSp mod">
+        <pc:chgData name="Khaled Henidak (KAL)" userId="afa32885-6881-4d74-93e5-2f713e8c2558" providerId="ADAL" clId="{5A9E4669-AE38-924A-8641-4841E83F8B36}" dt="2023-06-04T15:41:19.966" v="159" actId="20577"/>
+        <pc:sldMkLst>
+          <pc:docMk/>
+          <pc:sldMk cId="2967712447" sldId="268"/>
+        </pc:sldMkLst>
+        <pc:spChg chg="mod">
+          <ac:chgData name="Khaled Henidak (KAL)" userId="afa32885-6881-4d74-93e5-2f713e8c2558" providerId="ADAL" clId="{5A9E4669-AE38-924A-8641-4841E83F8B36}" dt="2023-06-04T15:41:19.966" v="159" actId="20577"/>
+          <ac:spMkLst>
+            <pc:docMk/>
+            <pc:sldMk cId="2967712447" sldId="268"/>
+            <ac:spMk id="3" creationId="{B2552CD2-3AE2-4C42-8429-42ABE27082EE}"/>
+          </ac:spMkLst>
+        </pc:spChg>
+      </pc:sldChg>
+      <pc:sldChg chg="modSp mod">
+        <pc:chgData name="Khaled Henidak (KAL)" userId="afa32885-6881-4d74-93e5-2f713e8c2558" providerId="ADAL" clId="{5A9E4669-AE38-924A-8641-4841E83F8B36}" dt="2023-06-04T15:42:16.067" v="236" actId="20577"/>
+        <pc:sldMkLst>
+          <pc:docMk/>
+          <pc:sldMk cId="1108236673" sldId="271"/>
+        </pc:sldMkLst>
+        <pc:spChg chg="mod">
+          <ac:chgData name="Khaled Henidak (KAL)" userId="afa32885-6881-4d74-93e5-2f713e8c2558" providerId="ADAL" clId="{5A9E4669-AE38-924A-8641-4841E83F8B36}" dt="2023-06-04T15:42:16.067" v="236" actId="20577"/>
+          <ac:spMkLst>
+            <pc:docMk/>
+            <pc:sldMk cId="1108236673" sldId="271"/>
+            <ac:spMk id="4" creationId="{C40F18E7-A22D-9B41-8A3E-A2C4E8C9D722}"/>
+          </ac:spMkLst>
+        </pc:spChg>
+      </pc:sldChg>
+      <pc:sldChg chg="modSp mod">
+        <pc:chgData name="Khaled Henidak (KAL)" userId="afa32885-6881-4d74-93e5-2f713e8c2558" providerId="ADAL" clId="{5A9E4669-AE38-924A-8641-4841E83F8B36}" dt="2023-06-04T15:46:14.459" v="262" actId="20577"/>
+        <pc:sldMkLst>
+          <pc:docMk/>
+          <pc:sldMk cId="2744810344" sldId="274"/>
+        </pc:sldMkLst>
+        <pc:spChg chg="mod">
+          <ac:chgData name="Khaled Henidak (KAL)" userId="afa32885-6881-4d74-93e5-2f713e8c2558" providerId="ADAL" clId="{5A9E4669-AE38-924A-8641-4841E83F8B36}" dt="2023-06-04T15:46:14.459" v="262" actId="20577"/>
+          <ac:spMkLst>
+            <pc:docMk/>
+            <pc:sldMk cId="2744810344" sldId="274"/>
+            <ac:spMk id="36" creationId="{784B56C9-928B-AE4B-A700-D73B109245B5}"/>
+          </ac:spMkLst>
+        </pc:spChg>
+      </pc:sldChg>
+      <pc:sldChg chg="modSp mod">
+        <pc:chgData name="Khaled Henidak (KAL)" userId="afa32885-6881-4d74-93e5-2f713e8c2558" providerId="ADAL" clId="{5A9E4669-AE38-924A-8641-4841E83F8B36}" dt="2023-06-04T16:00:10.587" v="986" actId="5793"/>
+        <pc:sldMkLst>
+          <pc:docMk/>
+          <pc:sldMk cId="1082702393" sldId="276"/>
+        </pc:sldMkLst>
+        <pc:spChg chg="mod">
+          <ac:chgData name="Khaled Henidak (KAL)" userId="afa32885-6881-4d74-93e5-2f713e8c2558" providerId="ADAL" clId="{5A9E4669-AE38-924A-8641-4841E83F8B36}" dt="2023-06-04T15:59:09.454" v="970" actId="1076"/>
+          <ac:spMkLst>
+            <pc:docMk/>
+            <pc:sldMk cId="1082702393" sldId="276"/>
+            <ac:spMk id="2" creationId="{A9E6DE50-98EA-4A4A-952C-B30D7EC7E473}"/>
+          </ac:spMkLst>
+        </pc:spChg>
+        <pc:spChg chg="mod">
+          <ac:chgData name="Khaled Henidak (KAL)" userId="afa32885-6881-4d74-93e5-2f713e8c2558" providerId="ADAL" clId="{5A9E4669-AE38-924A-8641-4841E83F8B36}" dt="2023-06-04T16:00:10.587" v="986" actId="5793"/>
+          <ac:spMkLst>
+            <pc:docMk/>
+            <pc:sldMk cId="1082702393" sldId="276"/>
+            <ac:spMk id="9" creationId="{A1669082-D5BA-0D4B-B7FC-7785E6F304D4}"/>
+          </ac:spMkLst>
+        </pc:spChg>
+        <pc:spChg chg="mod">
+          <ac:chgData name="Khaled Henidak (KAL)" userId="afa32885-6881-4d74-93e5-2f713e8c2558" providerId="ADAL" clId="{5A9E4669-AE38-924A-8641-4841E83F8B36}" dt="2023-06-04T15:58:46.301" v="958" actId="1076"/>
+          <ac:spMkLst>
+            <pc:docMk/>
+            <pc:sldMk cId="1082702393" sldId="276"/>
+            <ac:spMk id="10" creationId="{DC28462C-963A-E24D-B1BF-71A79E9EBA52}"/>
+          </ac:spMkLst>
+        </pc:spChg>
+        <pc:spChg chg="mod">
+          <ac:chgData name="Khaled Henidak (KAL)" userId="afa32885-6881-4d74-93e5-2f713e8c2558" providerId="ADAL" clId="{5A9E4669-AE38-924A-8641-4841E83F8B36}" dt="2023-06-04T15:58:46.301" v="958" actId="1076"/>
+          <ac:spMkLst>
+            <pc:docMk/>
+            <pc:sldMk cId="1082702393" sldId="276"/>
+            <ac:spMk id="11" creationId="{A05A4458-4F89-BB4A-B514-78B7D54C8450}"/>
+          </ac:spMkLst>
+        </pc:spChg>
+        <pc:spChg chg="mod">
+          <ac:chgData name="Khaled Henidak (KAL)" userId="afa32885-6881-4d74-93e5-2f713e8c2558" providerId="ADAL" clId="{5A9E4669-AE38-924A-8641-4841E83F8B36}" dt="2023-06-04T15:58:46.301" v="958" actId="1076"/>
+          <ac:spMkLst>
+            <pc:docMk/>
+            <pc:sldMk cId="1082702393" sldId="276"/>
+            <ac:spMk id="13" creationId="{CEFC197E-5943-5642-8EC6-D5A0AC24A105}"/>
+          </ac:spMkLst>
+        </pc:spChg>
+        <pc:spChg chg="mod">
+          <ac:chgData name="Khaled Henidak (KAL)" userId="afa32885-6881-4d74-93e5-2f713e8c2558" providerId="ADAL" clId="{5A9E4669-AE38-924A-8641-4841E83F8B36}" dt="2023-06-04T15:58:46.301" v="958" actId="1076"/>
+          <ac:spMkLst>
+            <pc:docMk/>
+            <pc:sldMk cId="1082702393" sldId="276"/>
+            <ac:spMk id="19" creationId="{8C7D17CC-42CD-5D4F-94AA-8E2364FB0966}"/>
+          </ac:spMkLst>
+        </pc:spChg>
+        <pc:spChg chg="mod">
+          <ac:chgData name="Khaled Henidak (KAL)" userId="afa32885-6881-4d74-93e5-2f713e8c2558" providerId="ADAL" clId="{5A9E4669-AE38-924A-8641-4841E83F8B36}" dt="2023-06-04T15:58:46.301" v="958" actId="1076"/>
+          <ac:spMkLst>
+            <pc:docMk/>
+            <pc:sldMk cId="1082702393" sldId="276"/>
+            <ac:spMk id="24" creationId="{E2AB29B5-4192-D64D-964A-702D14E0A051}"/>
+          </ac:spMkLst>
+        </pc:spChg>
+        <pc:spChg chg="mod">
+          <ac:chgData name="Khaled Henidak (KAL)" userId="afa32885-6881-4d74-93e5-2f713e8c2558" providerId="ADAL" clId="{5A9E4669-AE38-924A-8641-4841E83F8B36}" dt="2023-06-04T15:58:46.301" v="958" actId="1076"/>
+          <ac:spMkLst>
+            <pc:docMk/>
+            <pc:sldMk cId="1082702393" sldId="276"/>
+            <ac:spMk id="28" creationId="{181AA94A-3294-5349-A75C-69BF99E8F393}"/>
+          </ac:spMkLst>
+        </pc:spChg>
+        <pc:spChg chg="mod">
+          <ac:chgData name="Khaled Henidak (KAL)" userId="afa32885-6881-4d74-93e5-2f713e8c2558" providerId="ADAL" clId="{5A9E4669-AE38-924A-8641-4841E83F8B36}" dt="2023-06-04T15:58:46.301" v="958" actId="1076"/>
+          <ac:spMkLst>
+            <pc:docMk/>
+            <pc:sldMk cId="1082702393" sldId="276"/>
+            <ac:spMk id="31" creationId="{863CCAEC-687B-124C-8801-544AA224CB4F}"/>
+          </ac:spMkLst>
+        </pc:spChg>
+        <pc:spChg chg="mod">
+          <ac:chgData name="Khaled Henidak (KAL)" userId="afa32885-6881-4d74-93e5-2f713e8c2558" providerId="ADAL" clId="{5A9E4669-AE38-924A-8641-4841E83F8B36}" dt="2023-06-04T15:58:46.301" v="958" actId="1076"/>
+          <ac:spMkLst>
+            <pc:docMk/>
+            <pc:sldMk cId="1082702393" sldId="276"/>
+            <ac:spMk id="33" creationId="{8B390EE0-55EC-BB43-8B9D-8F9B934EC896}"/>
+          </ac:spMkLst>
+        </pc:spChg>
+        <pc:spChg chg="mod">
+          <ac:chgData name="Khaled Henidak (KAL)" userId="afa32885-6881-4d74-93e5-2f713e8c2558" providerId="ADAL" clId="{5A9E4669-AE38-924A-8641-4841E83F8B36}" dt="2023-06-04T15:58:46.301" v="958" actId="1076"/>
+          <ac:spMkLst>
+            <pc:docMk/>
+            <pc:sldMk cId="1082702393" sldId="276"/>
+            <ac:spMk id="34" creationId="{F64595FF-B9EC-D440-9265-93C1B582C772}"/>
+          </ac:spMkLst>
+        </pc:spChg>
+        <pc:spChg chg="mod">
+          <ac:chgData name="Khaled Henidak (KAL)" userId="afa32885-6881-4d74-93e5-2f713e8c2558" providerId="ADAL" clId="{5A9E4669-AE38-924A-8641-4841E83F8B36}" dt="2023-06-04T15:58:46.301" v="958" actId="1076"/>
+          <ac:spMkLst>
+            <pc:docMk/>
+            <pc:sldMk cId="1082702393" sldId="276"/>
+            <ac:spMk id="35" creationId="{8135FC08-FC42-6346-88E6-0310EA72C488}"/>
+          </ac:spMkLst>
+        </pc:spChg>
+        <pc:cxnChg chg="mod">
+          <ac:chgData name="Khaled Henidak (KAL)" userId="afa32885-6881-4d74-93e5-2f713e8c2558" providerId="ADAL" clId="{5A9E4669-AE38-924A-8641-4841E83F8B36}" dt="2023-06-04T15:58:46.301" v="958" actId="1076"/>
+          <ac:cxnSpMkLst>
+            <pc:docMk/>
+            <pc:sldMk cId="1082702393" sldId="276"/>
+            <ac:cxnSpMk id="18" creationId="{61475581-9D98-E140-8054-7FA88DA47739}"/>
+          </ac:cxnSpMkLst>
+        </pc:cxnChg>
+        <pc:cxnChg chg="mod">
+          <ac:chgData name="Khaled Henidak (KAL)" userId="afa32885-6881-4d74-93e5-2f713e8c2558" providerId="ADAL" clId="{5A9E4669-AE38-924A-8641-4841E83F8B36}" dt="2023-06-04T15:58:46.301" v="958" actId="1076"/>
+          <ac:cxnSpMkLst>
+            <pc:docMk/>
+            <pc:sldMk cId="1082702393" sldId="276"/>
+            <ac:cxnSpMk id="22" creationId="{EAD70647-ED73-DA48-B29D-D544DF34B542}"/>
+          </ac:cxnSpMkLst>
+        </pc:cxnChg>
+      </pc:sldChg>
+      <pc:sldChg chg="modSp new del mod">
+        <pc:chgData name="Khaled Henidak (KAL)" userId="afa32885-6881-4d74-93e5-2f713e8c2558" providerId="ADAL" clId="{5A9E4669-AE38-924A-8641-4841E83F8B36}" dt="2023-06-04T15:58:01.034" v="955" actId="2696"/>
+        <pc:sldMkLst>
+          <pc:docMk/>
+          <pc:sldMk cId="2173503693" sldId="279"/>
+        </pc:sldMkLst>
+        <pc:spChg chg="mod">
+          <ac:chgData name="Khaled Henidak (KAL)" userId="afa32885-6881-4d74-93e5-2f713e8c2558" providerId="ADAL" clId="{5A9E4669-AE38-924A-8641-4841E83F8B36}" dt="2023-06-04T15:55:03.771" v="834" actId="20577"/>
+          <ac:spMkLst>
+            <pc:docMk/>
+            <pc:sldMk cId="2173503693" sldId="279"/>
+            <ac:spMk id="2" creationId="{ADE1A636-ACAD-58A2-351D-4FC940137115}"/>
+          </ac:spMkLst>
+        </pc:spChg>
+        <pc:spChg chg="mod">
+          <ac:chgData name="Khaled Henidak (KAL)" userId="afa32885-6881-4d74-93e5-2f713e8c2558" providerId="ADAL" clId="{5A9E4669-AE38-924A-8641-4841E83F8B36}" dt="2023-06-04T15:57:45.971" v="954" actId="5793"/>
+          <ac:spMkLst>
+            <pc:docMk/>
+            <pc:sldMk cId="2173503693" sldId="279"/>
+            <ac:spMk id="3" creationId="{B78C38F9-C76E-17AA-0AB4-63C74E907427}"/>
+          </ac:spMkLst>
+        </pc:spChg>
+      </pc:sldChg>
+    </pc:docChg>
+  </pc:docChgLst>
+  <pc:docChgLst>
+    <pc:chgData name="Sumit Bhardwaj" userId="261ce338-1305-4461-a3a5-dbd34814d40c" providerId="ADAL" clId="{A9D6CFAB-9974-4CD5-B56D-138460125C95}"/>
+    <pc:docChg chg="custSel modSld sldOrd modSection">
+      <pc:chgData name="Sumit Bhardwaj" userId="261ce338-1305-4461-a3a5-dbd34814d40c" providerId="ADAL" clId="{A9D6CFAB-9974-4CD5-B56D-138460125C95}" dt="2024-05-02T18:01:50.981" v="87"/>
+      <pc:docMkLst>
+        <pc:docMk/>
+      </pc:docMkLst>
+      <pc:sldChg chg="modSp mod">
+        <pc:chgData name="Sumit Bhardwaj" userId="261ce338-1305-4461-a3a5-dbd34814d40c" providerId="ADAL" clId="{A9D6CFAB-9974-4CD5-B56D-138460125C95}" dt="2024-05-02T18:01:08.837" v="83" actId="6549"/>
+        <pc:sldMkLst>
+          <pc:docMk/>
+          <pc:sldMk cId="1109967106" sldId="258"/>
+        </pc:sldMkLst>
+        <pc:spChg chg="mod">
+          <ac:chgData name="Sumit Bhardwaj" userId="261ce338-1305-4461-a3a5-dbd34814d40c" providerId="ADAL" clId="{A9D6CFAB-9974-4CD5-B56D-138460125C95}" dt="2024-05-02T18:01:08.837" v="83" actId="6549"/>
+          <ac:spMkLst>
+            <pc:docMk/>
+            <pc:sldMk cId="1109967106" sldId="258"/>
+            <ac:spMk id="7" creationId="{01EBDD20-F47D-D54B-ABD0-F181DE71A8E4}"/>
+          </ac:spMkLst>
+        </pc:spChg>
+      </pc:sldChg>
+      <pc:sldChg chg="ord">
+        <pc:chgData name="Sumit Bhardwaj" userId="261ce338-1305-4461-a3a5-dbd34814d40c" providerId="ADAL" clId="{A9D6CFAB-9974-4CD5-B56D-138460125C95}" dt="2024-05-02T18:01:50.981" v="87"/>
+        <pc:sldMkLst>
+          <pc:docMk/>
+          <pc:sldMk cId="839801836" sldId="260"/>
+        </pc:sldMkLst>
+      </pc:sldChg>
+    </pc:docChg>
+  </pc:docChgLst>
+  <pc:docChgLst>
+    <pc:chgData name="Sumit Bhardwaj" userId="261ce338-1305-4461-a3a5-dbd34814d40c" providerId="ADAL" clId="{928D87A7-6EBA-4079-9B52-0E8CFC1E3FCC}"/>
+    <pc:docChg chg="custSel addSld modSld modSection">
+      <pc:chgData name="Sumit Bhardwaj" userId="261ce338-1305-4461-a3a5-dbd34814d40c" providerId="ADAL" clId="{928D87A7-6EBA-4079-9B52-0E8CFC1E3FCC}" dt="2024-05-02T19:13:30.888" v="81" actId="20577"/>
+      <pc:docMkLst>
+        <pc:docMk/>
+      </pc:docMkLst>
+      <pc:sldChg chg="modSp add mod">
+        <pc:chgData name="Sumit Bhardwaj" userId="261ce338-1305-4461-a3a5-dbd34814d40c" providerId="ADAL" clId="{928D87A7-6EBA-4079-9B52-0E8CFC1E3FCC}" dt="2024-05-02T19:13:30.888" v="81" actId="20577"/>
+        <pc:sldMkLst>
+          <pc:docMk/>
+          <pc:sldMk cId="2405958399" sldId="279"/>
+        </pc:sldMkLst>
+        <pc:spChg chg="mod">
+          <ac:chgData name="Sumit Bhardwaj" userId="261ce338-1305-4461-a3a5-dbd34814d40c" providerId="ADAL" clId="{928D87A7-6EBA-4079-9B52-0E8CFC1E3FCC}" dt="2024-05-02T19:13:02.761" v="8" actId="20577"/>
+          <ac:spMkLst>
+            <pc:docMk/>
+            <pc:sldMk cId="2405958399" sldId="279"/>
+            <ac:spMk id="2" creationId="{FC6A5FEB-241A-FF42-A3EF-29DF514DBDE7}"/>
+          </ac:spMkLst>
+        </pc:spChg>
+        <pc:spChg chg="mod">
+          <ac:chgData name="Sumit Bhardwaj" userId="261ce338-1305-4461-a3a5-dbd34814d40c" providerId="ADAL" clId="{928D87A7-6EBA-4079-9B52-0E8CFC1E3FCC}" dt="2024-05-02T19:13:30.888" v="81" actId="20577"/>
+          <ac:spMkLst>
+            <pc:docMk/>
+            <pc:sldMk cId="2405958399" sldId="279"/>
+            <ac:spMk id="3" creationId="{ECF221FA-1A72-EB41-B494-7AE1C357CCC9}"/>
           </ac:spMkLst>
         </pc:spChg>
       </pc:sldChg>
@@ -2003,7 +2369,7 @@
           <a:p>
             <a:fld id="{C6AF4A8B-E087-314F-B042-E4C73B533A55}" type="datetimeFigureOut">
               <a:rPr lang="en-US" smtClean="0"/>
-              <a:t>10/19/21</a:t>
+              <a:t>24/05/02</a:t>
             </a:fld>
             <a:endParaRPr lang="en-US"/>
           </a:p>
@@ -2429,10 +2795,7 @@
           <a:bodyPr/>
           <a:lstStyle/>
           <a:p>
-            <a:r>
-              <a:rPr lang="en-US" dirty="0"/>
-              <a:t>We didn’t cover capabilities with demos. We are thinking about a “security day” and this topic will be covered there.</a:t>
-            </a:r>
+            <a:endParaRPr lang="en-US" dirty="0"/>
           </a:p>
         </p:txBody>
       </p:sp>
@@ -2463,6 +2826,90 @@
     <p:extLst>
       <p:ext uri="{BB962C8B-B14F-4D97-AF65-F5344CB8AC3E}">
         <p14:creationId xmlns:p14="http://schemas.microsoft.com/office/powerpoint/2010/main" val="2434901557"/>
+      </p:ext>
+    </p:extLst>
+  </p:cSld>
+  <p:clrMapOvr>
+    <a:masterClrMapping/>
+  </p:clrMapOvr>
+</p:notes>
+</file>
+
+<file path=ppt/notesSlides/notesSlide11.xml><?xml version="1.0" encoding="utf-8"?>
+<p:notes xmlns:a="http://schemas.openxmlformats.org/drawingml/2006/main" xmlns:r="http://schemas.openxmlformats.org/officeDocument/2006/relationships" xmlns:p="http://schemas.openxmlformats.org/presentationml/2006/main">
+  <p:cSld>
+    <p:spTree>
+      <p:nvGrpSpPr>
+        <p:cNvPr id="1" name=""/>
+        <p:cNvGrpSpPr/>
+        <p:nvPr/>
+      </p:nvGrpSpPr>
+      <p:grpSpPr>
+        <a:xfrm>
+          <a:off x="0" y="0"/>
+          <a:ext cx="0" cy="0"/>
+          <a:chOff x="0" y="0"/>
+          <a:chExt cx="0" cy="0"/>
+        </a:xfrm>
+      </p:grpSpPr>
+      <p:sp>
+        <p:nvSpPr>
+          <p:cNvPr id="2" name="Slide Image Placeholder 1"/>
+          <p:cNvSpPr>
+            <a:spLocks noGrp="1" noRot="1" noChangeAspect="1"/>
+          </p:cNvSpPr>
+          <p:nvPr>
+            <p:ph type="sldImg"/>
+          </p:nvPr>
+        </p:nvSpPr>
+        <p:spPr/>
+      </p:sp>
+      <p:sp>
+        <p:nvSpPr>
+          <p:cNvPr id="3" name="Notes Placeholder 2"/>
+          <p:cNvSpPr>
+            <a:spLocks noGrp="1"/>
+          </p:cNvSpPr>
+          <p:nvPr>
+            <p:ph type="body" idx="1"/>
+          </p:nvPr>
+        </p:nvSpPr>
+        <p:spPr/>
+        <p:txBody>
+          <a:bodyPr/>
+          <a:lstStyle/>
+          <a:p>
+            <a:endParaRPr lang="en-US" dirty="0"/>
+          </a:p>
+        </p:txBody>
+      </p:sp>
+      <p:sp>
+        <p:nvSpPr>
+          <p:cNvPr id="4" name="Slide Number Placeholder 3"/>
+          <p:cNvSpPr>
+            <a:spLocks noGrp="1"/>
+          </p:cNvSpPr>
+          <p:nvPr>
+            <p:ph type="sldNum" sz="quarter" idx="5"/>
+          </p:nvPr>
+        </p:nvSpPr>
+        <p:spPr/>
+        <p:txBody>
+          <a:bodyPr/>
+          <a:lstStyle/>
+          <a:p>
+            <a:fld id="{A9942C57-52FF-0B42-AAE7-1AB7BB99BEF7}" type="slidenum">
+              <a:rPr lang="en-US" smtClean="0"/>
+              <a:t>22</a:t>
+            </a:fld>
+            <a:endParaRPr lang="en-US"/>
+          </a:p>
+        </p:txBody>
+      </p:sp>
+    </p:spTree>
+    <p:extLst>
+      <p:ext uri="{BB962C8B-B14F-4D97-AF65-F5344CB8AC3E}">
+        <p14:creationId xmlns:p14="http://schemas.microsoft.com/office/powerpoint/2010/main" val="2982590999"/>
       </p:ext>
     </p:extLst>
   </p:cSld>
@@ -2526,16 +2973,6 @@
             <a:r>
               <a:rPr lang="en-US" dirty="0"/>
               <a:t>We have a plan but it is not carved in stones, if we see a reason to change, we will change (your feedback is highly appreciated)</a:t>
-            </a:r>
-          </a:p>
-          <a:p>
-            <a:pPr marL="171450" indent="-171450">
-              <a:buFont typeface="Arial" panose="020B0604020202020204" pitchFamily="34" charset="0"/>
-              <a:buChar char="•"/>
-            </a:pPr>
-            <a:r>
-              <a:rPr lang="en-US" dirty="0"/>
-              <a:t>** holiday break</a:t>
             </a:r>
           </a:p>
         </p:txBody>
@@ -2620,10 +3057,7 @@
           <a:bodyPr/>
           <a:lstStyle/>
           <a:p>
-            <a:r>
-              <a:rPr lang="en-US" dirty="0"/>
-              <a:t>* We have a session focused on that. Stay tuned</a:t>
-            </a:r>
+            <a:endParaRPr lang="en-US" dirty="0"/>
           </a:p>
         </p:txBody>
       </p:sp>
@@ -2653,7 +3087,7 @@
     </p:spTree>
     <p:extLst>
       <p:ext uri="{BB962C8B-B14F-4D97-AF65-F5344CB8AC3E}">
-        <p14:creationId xmlns:p14="http://schemas.microsoft.com/office/powerpoint/2010/main" val="2788684885"/>
+        <p14:creationId xmlns:p14="http://schemas.microsoft.com/office/powerpoint/2010/main" val="1303638422"/>
       </p:ext>
     </p:extLst>
   </p:cSld>
@@ -2707,7 +3141,10 @@
           <a:bodyPr/>
           <a:lstStyle/>
           <a:p>
-            <a:endParaRPr lang="en-US" dirty="0"/>
+            <a:r>
+              <a:rPr lang="en-US" dirty="0"/>
+              <a:t>* We have a session focused on that. Stay tuned</a:t>
+            </a:r>
           </a:p>
         </p:txBody>
       </p:sp>
@@ -2728,7 +3165,7 @@
           <a:p>
             <a:fld id="{A9942C57-52FF-0B42-AAE7-1AB7BB99BEF7}" type="slidenum">
               <a:rPr lang="en-US" smtClean="0"/>
-              <a:t>6</a:t>
+              <a:t>8</a:t>
             </a:fld>
             <a:endParaRPr lang="en-US"/>
           </a:p>
@@ -2737,7 +3174,7 @@
     </p:spTree>
     <p:extLst>
       <p:ext uri="{BB962C8B-B14F-4D97-AF65-F5344CB8AC3E}">
-        <p14:creationId xmlns:p14="http://schemas.microsoft.com/office/powerpoint/2010/main" val="1303638422"/>
+        <p14:creationId xmlns:p14="http://schemas.microsoft.com/office/powerpoint/2010/main" val="2788684885"/>
       </p:ext>
     </p:extLst>
   </p:cSld>
@@ -3046,10 +3483,7 @@
           <a:bodyPr/>
           <a:lstStyle/>
           <a:p>
-            <a:r>
-              <a:rPr lang="en-US" dirty="0"/>
-              <a:t>* We have a session focused on that. Stay tuned</a:t>
-            </a:r>
+            <a:endParaRPr lang="en-US" dirty="0"/>
           </a:p>
         </p:txBody>
       </p:sp>
@@ -3304,7 +3738,7 @@
           <a:p>
             <a:fld id="{846CE7D5-CF57-46EF-B807-FDD0502418D4}" type="datetimeFigureOut">
               <a:rPr lang="en-US" smtClean="0"/>
-              <a:t>10/19/21</a:t>
+              <a:t>24/05/02</a:t>
             </a:fld>
             <a:endParaRPr lang="en-US"/>
           </a:p>
@@ -3474,7 +3908,7 @@
           <a:p>
             <a:fld id="{846CE7D5-CF57-46EF-B807-FDD0502418D4}" type="datetimeFigureOut">
               <a:rPr lang="en-US" smtClean="0"/>
-              <a:t>10/19/21</a:t>
+              <a:t>24/05/02</a:t>
             </a:fld>
             <a:endParaRPr lang="en-US"/>
           </a:p>
@@ -3654,7 +4088,7 @@
           <a:p>
             <a:fld id="{846CE7D5-CF57-46EF-B807-FDD0502418D4}" type="datetimeFigureOut">
               <a:rPr lang="en-US" smtClean="0"/>
-              <a:t>10/19/21</a:t>
+              <a:t>24/05/02</a:t>
             </a:fld>
             <a:endParaRPr lang="en-US"/>
           </a:p>
@@ -3824,7 +4258,7 @@
           <a:p>
             <a:fld id="{846CE7D5-CF57-46EF-B807-FDD0502418D4}" type="datetimeFigureOut">
               <a:rPr lang="en-US" smtClean="0"/>
-              <a:t>10/19/21</a:t>
+              <a:t>24/05/02</a:t>
             </a:fld>
             <a:endParaRPr lang="en-US"/>
           </a:p>
@@ -4070,7 +4504,7 @@
           <a:p>
             <a:fld id="{846CE7D5-CF57-46EF-B807-FDD0502418D4}" type="datetimeFigureOut">
               <a:rPr lang="en-US" smtClean="0"/>
-              <a:t>10/19/21</a:t>
+              <a:t>24/05/02</a:t>
             </a:fld>
             <a:endParaRPr lang="en-US"/>
           </a:p>
@@ -4302,7 +4736,7 @@
           <a:p>
             <a:fld id="{846CE7D5-CF57-46EF-B807-FDD0502418D4}" type="datetimeFigureOut">
               <a:rPr lang="en-US" smtClean="0"/>
-              <a:t>10/19/21</a:t>
+              <a:t>24/05/02</a:t>
             </a:fld>
             <a:endParaRPr lang="en-US"/>
           </a:p>
@@ -4669,7 +5103,7 @@
           <a:p>
             <a:fld id="{846CE7D5-CF57-46EF-B807-FDD0502418D4}" type="datetimeFigureOut">
               <a:rPr lang="en-US" smtClean="0"/>
-              <a:t>10/19/21</a:t>
+              <a:t>24/05/02</a:t>
             </a:fld>
             <a:endParaRPr lang="en-US"/>
           </a:p>
@@ -4787,7 +5221,7 @@
           <a:p>
             <a:fld id="{846CE7D5-CF57-46EF-B807-FDD0502418D4}" type="datetimeFigureOut">
               <a:rPr lang="en-US" smtClean="0"/>
-              <a:t>10/19/21</a:t>
+              <a:t>24/05/02</a:t>
             </a:fld>
             <a:endParaRPr lang="en-US"/>
           </a:p>
@@ -4882,7 +5316,7 @@
           <a:p>
             <a:fld id="{846CE7D5-CF57-46EF-B807-FDD0502418D4}" type="datetimeFigureOut">
               <a:rPr lang="en-US" smtClean="0"/>
-              <a:t>10/19/21</a:t>
+              <a:t>24/05/02</a:t>
             </a:fld>
             <a:endParaRPr lang="en-US"/>
           </a:p>
@@ -5159,7 +5593,7 @@
           <a:p>
             <a:fld id="{846CE7D5-CF57-46EF-B807-FDD0502418D4}" type="datetimeFigureOut">
               <a:rPr lang="en-US" smtClean="0"/>
-              <a:t>10/19/21</a:t>
+              <a:t>24/05/02</a:t>
             </a:fld>
             <a:endParaRPr lang="en-US"/>
           </a:p>
@@ -5416,7 +5850,7 @@
           <a:p>
             <a:fld id="{846CE7D5-CF57-46EF-B807-FDD0502418D4}" type="datetimeFigureOut">
               <a:rPr lang="en-US" smtClean="0"/>
-              <a:t>10/19/21</a:t>
+              <a:t>24/05/02</a:t>
             </a:fld>
             <a:endParaRPr lang="en-US"/>
           </a:p>
@@ -5629,7 +6063,7 @@
           <a:p>
             <a:fld id="{846CE7D5-CF57-46EF-B807-FDD0502418D4}" type="datetimeFigureOut">
               <a:rPr lang="en-US" smtClean="0"/>
-              <a:t>10/19/21</a:t>
+              <a:t>24/05/02</a:t>
             </a:fld>
             <a:endParaRPr lang="en-US"/>
           </a:p>
@@ -6077,14 +6511,6 @@
             </a:r>
           </a:p>
           <a:p>
-            <a:r>
-              <a:rPr lang="en-US" dirty="0"/>
-              <a:t>@</a:t>
-            </a:r>
-            <a:r>
-              <a:rPr lang="en-US" dirty="0" err="1"/>
-              <a:t>khenidak</a:t>
-            </a:r>
             <a:endParaRPr lang="en-US" dirty="0"/>
           </a:p>
         </p:txBody>
@@ -6104,7 +6530,7 @@
         <p:spPr>
           <a:xfrm>
             <a:off x="11003280" y="6522720"/>
-            <a:ext cx="1112805" cy="276999"/>
+            <a:ext cx="906017" cy="276999"/>
           </a:xfrm>
           <a:prstGeom prst="rect">
             <a:avLst/>
@@ -6119,15 +6545,7 @@
           <a:p>
             <a:r>
               <a:rPr lang="en-US" sz="1200" dirty="0"/>
-              <a:t>Oct 29</a:t>
-            </a:r>
-            <a:r>
-              <a:rPr lang="en-US" sz="1200" baseline="30000" dirty="0"/>
-              <a:t>th</a:t>
-            </a:r>
-            <a:r>
-              <a:rPr lang="en-US" sz="1200" dirty="0"/>
-              <a:t> 20121</a:t>
+              <a:t>2024-05-03</a:t>
             </a:r>
           </a:p>
         </p:txBody>
@@ -6178,13 +6596,20 @@
             <p:ph type="title"/>
           </p:nvPr>
         </p:nvSpPr>
-        <p:spPr/>
-        <p:txBody>
-          <a:bodyPr/>
-          <a:lstStyle/>
-          <a:p>
-            <a:r>
-              <a:rPr lang="en-US" dirty="0"/>
+        <p:spPr>
+          <a:xfrm>
+            <a:off x="136999" y="209360"/>
+            <a:ext cx="6061920" cy="681289"/>
+          </a:xfrm>
+        </p:spPr>
+        <p:txBody>
+          <a:bodyPr>
+            <a:normAutofit/>
+          </a:bodyPr>
+          <a:lstStyle/>
+          <a:p>
+            <a:r>
+              <a:rPr lang="en-US" sz="3600" dirty="0"/>
               <a:t>Process Memory</a:t>
             </a:r>
           </a:p>
@@ -6208,13 +6633,13 @@
         </p:nvSpPr>
         <p:spPr>
           <a:xfrm>
-            <a:off x="838200" y="1825625"/>
-            <a:ext cx="6149501" cy="4351338"/>
+            <a:off x="237506" y="890648"/>
+            <a:ext cx="6750195" cy="5705741"/>
           </a:xfrm>
         </p:spPr>
         <p:txBody>
           <a:bodyPr>
-            <a:normAutofit/>
+            <a:normAutofit fontScale="85000" lnSpcReduction="20000"/>
           </a:bodyPr>
           <a:lstStyle/>
           <a:p>
@@ -6226,7 +6651,7 @@
           <a:p>
             <a:r>
               <a:rPr lang="en-US" dirty="0"/>
-              <a:t>General placement is static, but actual is randomized (</a:t>
+              <a:t>General placement order of things is static, but actual start address is randomized (</a:t>
             </a:r>
             <a:r>
               <a:rPr lang="en-US" dirty="0" err="1"/>
@@ -6255,6 +6680,26 @@
             <a:r>
               <a:rPr lang="en-US" dirty="0"/>
               <a:t>  saved at the top of the address space (bottom of kernel stack) allowing kernel to do quick lookup to current process.</a:t>
+            </a:r>
+          </a:p>
+          <a:p>
+            <a:r>
+              <a:rPr lang="en-US" dirty="0"/>
+              <a:t>Kernel manages memory as chunks of &lt;PAGE_SIZE&gt; usually 4K. Userspace memory is entirely virtualized (e.g. virtual pages are mapped to physical memory). And is done by MMUs TLB (Translation Lookaside buffer).</a:t>
+            </a:r>
+          </a:p>
+          <a:p>
+            <a:r>
+              <a:rPr lang="en-US" dirty="0"/>
+              <a:t>Processes can be configured for </a:t>
+            </a:r>
+            <a:r>
+              <a:rPr lang="en-US" i="1" dirty="0"/>
+              <a:t>H</a:t>
+            </a:r>
+            <a:r>
+              <a:rPr lang="en-US" dirty="0"/>
+              <a:t>TLB. Idea being if you map a large continuous chunk of physical mem say 1GB then memory addresses within the chunk won’t need to go to through MMU TLBs (for super-duper high throughput apps).</a:t>
             </a:r>
           </a:p>
         </p:txBody>
@@ -6550,13 +6995,20 @@
             <p:ph type="title"/>
           </p:nvPr>
         </p:nvSpPr>
-        <p:spPr/>
-        <p:txBody>
-          <a:bodyPr/>
-          <a:lstStyle/>
-          <a:p>
-            <a:r>
-              <a:rPr lang="en-US" dirty="0"/>
+        <p:spPr>
+          <a:xfrm>
+            <a:off x="113805" y="143261"/>
+            <a:ext cx="4493821" cy="532341"/>
+          </a:xfrm>
+        </p:spPr>
+        <p:txBody>
+          <a:bodyPr>
+            <a:normAutofit/>
+          </a:bodyPr>
+          <a:lstStyle/>
+          <a:p>
+            <a:r>
+              <a:rPr lang="en-US" sz="2800" dirty="0"/>
               <a:t>Process Memory</a:t>
             </a:r>
           </a:p>
@@ -6580,13 +7032,13 @@
         </p:nvSpPr>
         <p:spPr>
           <a:xfrm>
-            <a:off x="838201" y="1825625"/>
-            <a:ext cx="4983480" cy="4351338"/>
+            <a:off x="201882" y="783771"/>
+            <a:ext cx="7408208" cy="5393192"/>
           </a:xfrm>
         </p:spPr>
         <p:txBody>
           <a:bodyPr>
-            <a:normAutofit fontScale="85000" lnSpcReduction="20000"/>
+            <a:normAutofit/>
           </a:bodyPr>
           <a:lstStyle/>
           <a:p>
@@ -6630,51 +7082,43 @@
             </a:r>
             <a:r>
               <a:rPr lang="en-US" dirty="0"/>
-              <a:t>(2) by using anonymous/private maps process maps parts of its memory space to physical memory.</a:t>
+              <a:t>(2) by using anonymous/private maps process maps parts of its memory space to physical memory || FILE || DEVICE (WHERE SUPPORTED).</a:t>
             </a:r>
           </a:p>
           <a:p>
             <a:pPr lvl="1"/>
             <a:r>
               <a:rPr lang="en-US" dirty="0"/>
-              <a:t>Both are done via </a:t>
+              <a:t>Both are done via malloc(3) in </a:t>
             </a:r>
             <a:r>
               <a:rPr lang="en-US" dirty="0" err="1"/>
-              <a:t>libc</a:t>
-            </a:r>
-            <a:r>
-              <a:rPr lang="en-US" dirty="0"/>
-              <a:t> malloc(3) which makes the decision internally.</a:t>
-            </a:r>
-          </a:p>
-          <a:p>
-            <a:r>
-              <a:rPr lang="en-US" dirty="0"/>
-              <a:t>Memory is allocated in chunks of &lt;page-size&gt; and mapped to </a:t>
-            </a:r>
-            <a:r>
-              <a:rPr lang="en-US" dirty="0" err="1"/>
-              <a:t>phiscal</a:t>
-            </a:r>
-            <a:r>
-              <a:rPr lang="en-US" dirty="0"/>
-              <a:t> memory. </a:t>
+              <a:t>glibc</a:t>
+            </a:r>
+            <a:r>
+              <a:rPr lang="en-US" dirty="0"/>
+              <a:t> (or equivalent) which makes the decision internally.</a:t>
+            </a:r>
+          </a:p>
+          <a:p>
+            <a:r>
+              <a:rPr lang="en-US" dirty="0"/>
+              <a:t>Memory is allocated in chunks of &lt;page-size&gt; and mapped to physical memory. </a:t>
             </a:r>
             <a:r>
               <a:rPr lang="en-US" i="1" dirty="0"/>
-              <a:t>A continues space in virtual mem != continues space in physical memory*</a:t>
-            </a:r>
-            <a:r>
-              <a:rPr lang="en-US" dirty="0"/>
-              <a:t>. Memory is not allocated until it is read/write.</a:t>
-            </a:r>
-          </a:p>
-          <a:p>
-            <a:r>
-              <a:rPr lang="en-US" dirty="0"/>
-              <a:t>More in memory session</a:t>
-            </a:r>
+              <a:t>A continuous space in virtual mem != continuous space in physical memory</a:t>
+            </a:r>
+            <a:r>
+              <a:rPr lang="en-US" dirty="0"/>
+              <a:t>. Memory is not allocated until it is read or written.</a:t>
+            </a:r>
+          </a:p>
+          <a:p>
+            <a:pPr marL="0" indent="0">
+              <a:buNone/>
+            </a:pPr>
+            <a:endParaRPr lang="en-US" dirty="0"/>
           </a:p>
         </p:txBody>
       </p:sp>
@@ -6855,7 +7299,7 @@
         </p:nvSpPr>
         <p:spPr>
           <a:xfrm>
-            <a:off x="6781800" y="1217724"/>
+            <a:off x="7859472" y="1158347"/>
             <a:ext cx="1508760" cy="4558235"/>
           </a:xfrm>
           <a:prstGeom prst="roundRect">
@@ -6906,7 +7350,7 @@
         </p:nvSpPr>
         <p:spPr>
           <a:xfrm>
-            <a:off x="6861404" y="1825625"/>
+            <a:off x="7939076" y="1766248"/>
             <a:ext cx="1356360" cy="933688"/>
           </a:xfrm>
           <a:prstGeom prst="roundRect">
@@ -6957,7 +7401,7 @@
         </p:nvSpPr>
         <p:spPr>
           <a:xfrm>
-            <a:off x="9345496" y="2983541"/>
+            <a:off x="10423168" y="2924164"/>
             <a:ext cx="1356360" cy="933688"/>
           </a:xfrm>
           <a:prstGeom prst="roundRect">
@@ -7012,7 +7456,7 @@
         </p:nvCxnSpPr>
         <p:spPr>
           <a:xfrm>
-            <a:off x="8217764" y="2292469"/>
+            <a:off x="9295436" y="2233092"/>
             <a:ext cx="1127732" cy="1157916"/>
           </a:xfrm>
           <a:prstGeom prst="straightConnector1">
@@ -7051,7 +7495,7 @@
         </p:nvSpPr>
         <p:spPr>
           <a:xfrm>
-            <a:off x="6876617" y="2924730"/>
+            <a:off x="7954289" y="2865353"/>
             <a:ext cx="1356360" cy="933688"/>
           </a:xfrm>
           <a:prstGeom prst="roundRect">
@@ -7106,7 +7550,7 @@
         </p:nvCxnSpPr>
         <p:spPr>
           <a:xfrm flipV="1">
-            <a:off x="8290560" y="2505857"/>
+            <a:off x="9368232" y="2446480"/>
             <a:ext cx="1054936" cy="990985"/>
           </a:xfrm>
           <a:prstGeom prst="straightConnector1">
@@ -7145,7 +7589,7 @@
         </p:nvSpPr>
         <p:spPr>
           <a:xfrm>
-            <a:off x="9345496" y="2039013"/>
+            <a:off x="10423168" y="1979636"/>
             <a:ext cx="1356360" cy="933688"/>
           </a:xfrm>
           <a:prstGeom prst="roundRect">
@@ -7196,7 +7640,7 @@
         </p:nvSpPr>
         <p:spPr>
           <a:xfrm>
-            <a:off x="9341252" y="3928069"/>
+            <a:off x="10418924" y="3868692"/>
             <a:ext cx="1356360" cy="933688"/>
           </a:xfrm>
           <a:prstGeom prst="roundRect">
@@ -7247,7 +7691,7 @@
         </p:nvSpPr>
         <p:spPr>
           <a:xfrm>
-            <a:off x="9341252" y="1094485"/>
+            <a:off x="10418924" y="1035108"/>
             <a:ext cx="1356360" cy="933688"/>
           </a:xfrm>
           <a:prstGeom prst="roundRect">
@@ -7298,7 +7742,7 @@
         </p:nvSpPr>
         <p:spPr>
           <a:xfrm>
-            <a:off x="9134798" y="623119"/>
+            <a:off x="10212470" y="563742"/>
             <a:ext cx="1769267" cy="369332"/>
           </a:xfrm>
           <a:prstGeom prst="rect">
@@ -7333,7 +7777,7 @@
         </p:nvSpPr>
         <p:spPr>
           <a:xfrm>
-            <a:off x="7284720" y="1021080"/>
+            <a:off x="8362392" y="961703"/>
             <a:ext cx="184731" cy="369332"/>
           </a:xfrm>
           <a:prstGeom prst="rect">
@@ -7365,7 +7809,7 @@
         </p:nvSpPr>
         <p:spPr>
           <a:xfrm>
-            <a:off x="6685488" y="596258"/>
+            <a:off x="7763160" y="536881"/>
             <a:ext cx="1738617" cy="369332"/>
           </a:xfrm>
           <a:prstGeom prst="rect">
@@ -7507,7 +7951,7 @@
             </a:r>
             <a:r>
               <a:rPr lang="en-US" dirty="0"/>
-              <a:t> bases. Enforced </a:t>
+              <a:t> basis. Enforced </a:t>
             </a:r>
             <a:r>
               <a:rPr lang="en-US" b="1" i="1" dirty="0"/>
@@ -7565,7 +8009,7 @@
             </a:r>
             <a:r>
               <a:rPr lang="en-US" dirty="0"/>
-              <a:t>is running to it</a:t>
+              <a:t>is a member of it</a:t>
             </a:r>
             <a:r>
               <a:rPr lang="en-US" b="1" i="1" dirty="0"/>
@@ -7682,7 +8126,7 @@
               <a:t>¯\_(</a:t>
             </a:r>
             <a:r>
-              <a:rPr lang="ja-JP" altLang="en-US" b="0" i="0">
+              <a:rPr lang="ja-JP" altLang="en-US" b="0" i="0" dirty="0">
                 <a:solidFill>
                   <a:srgbClr val="000000"/>
                 </a:solidFill>
@@ -7834,7 +8278,7 @@
             </a:pPr>
             <a:r>
               <a:rPr lang="en-US" dirty="0"/>
-              <a:t>Has a set of </a:t>
+              <a:t>Has an assigned set of </a:t>
             </a:r>
             <a:r>
               <a:rPr lang="en-US" b="1" dirty="0"/>
@@ -7882,7 +8326,7 @@
             <a:pPr marL="742950" lvl="1" indent="-285750"/>
             <a:r>
               <a:rPr lang="en-US" dirty="0"/>
-              <a:t>Views are called </a:t>
+              <a:t>Those views are called </a:t>
             </a:r>
             <a:r>
               <a:rPr lang="en-US" b="1" i="1" dirty="0"/>
@@ -8091,7 +8535,15 @@
           <a:p>
             <a:r>
               <a:rPr lang="en-US" dirty="0"/>
-              <a:t>IPC allows process to “talk” to each others. IPC exited before networking but was limited to single box.</a:t>
+              <a:t>IPC allows process to “</a:t>
+            </a:r>
+            <a:r>
+              <a:rPr lang="en-US" i="1" dirty="0"/>
+              <a:t>talk</a:t>
+            </a:r>
+            <a:r>
+              <a:rPr lang="en-US" dirty="0"/>
+              <a:t>” to each others. IPC exited before networking but was limited to single box.</a:t>
             </a:r>
           </a:p>
           <a:p>
@@ -8118,7 +8570,7 @@
             <a:pPr lvl="1"/>
             <a:r>
               <a:rPr lang="en-US" dirty="0"/>
-              <a:t>Ease of use.</a:t>
+              <a:t>Ease of use (e.g., easy one support request/response style “talking”).</a:t>
             </a:r>
           </a:p>
         </p:txBody>
@@ -9663,7 +10115,7 @@
         <p:spPr>
           <a:xfrm>
             <a:off x="123578" y="899160"/>
-            <a:ext cx="5481366" cy="5632311"/>
+            <a:ext cx="5481366" cy="5355312"/>
           </a:xfrm>
           <a:prstGeom prst="rect">
             <a:avLst/>
@@ -9690,7 +10142,7 @@
             </a:r>
             <a:r>
               <a:rPr lang="en-US" dirty="0"/>
-              <a:t>(3)). You can exclusively use </a:t>
+              <a:t>(3)) or using </a:t>
             </a:r>
             <a:r>
               <a:rPr lang="en-US" dirty="0" err="1"/>
@@ -9698,7 +10150,7 @@
             </a:r>
             <a:r>
               <a:rPr lang="en-US" dirty="0"/>
-              <a:t>(2) too (sharing is limited to same or child process).</a:t>
+              <a:t>(2).</a:t>
             </a:r>
           </a:p>
           <a:p>
@@ -9853,7 +10305,7 @@
             </a:pPr>
             <a:r>
               <a:rPr lang="en-US" dirty="0"/>
-              <a:t>Requires inter process synchronization typically done by using a well-known address (e.g., first 64bit of the map) as a lock. Locks are typically acquired using compare-swap calls (which looks a lot like spin-wait). Alternatively, semaphores can also be used (but they tend to be clunky).</a:t>
+              <a:t>Requires inter process synchronization typically done by using a well-known address (e.g., first 64bit of the map) as a lock. Locks are typically acquired using compare-swap calls (e.g., spin-wait). Alternatively, semaphores can also be used (but they tend to be clunky).</a:t>
             </a:r>
           </a:p>
           <a:p>
@@ -10227,31 +10679,6 @@
           </a:p>
         </p:txBody>
       </p:sp>
-      <p:sp>
-        <p:nvSpPr>
-          <p:cNvPr id="5" name="Text Placeholder 4">
-            <a:extLst>
-              <a:ext uri="{FF2B5EF4-FFF2-40B4-BE49-F238E27FC236}">
-                <a16:creationId xmlns:a16="http://schemas.microsoft.com/office/drawing/2014/main" id="{A4A9C974-83DD-4146-ADC1-A553B1174079}"/>
-              </a:ext>
-            </a:extLst>
-          </p:cNvPr>
-          <p:cNvSpPr>
-            <a:spLocks noGrp="1"/>
-          </p:cNvSpPr>
-          <p:nvPr>
-            <p:ph type="body" idx="1"/>
-          </p:nvPr>
-        </p:nvSpPr>
-        <p:spPr/>
-        <p:txBody>
-          <a:bodyPr/>
-          <a:lstStyle/>
-          <a:p>
-            <a:endParaRPr lang="en-US" dirty="0"/>
-          </a:p>
-        </p:txBody>
-      </p:sp>
     </p:spTree>
     <p:extLst>
       <p:ext uri="{BB962C8B-B14F-4D97-AF65-F5344CB8AC3E}">
@@ -10412,7 +10839,7 @@
         <p:spPr/>
         <p:txBody>
           <a:bodyPr>
-            <a:normAutofit fontScale="92500" lnSpcReduction="20000"/>
+            <a:normAutofit fontScale="70000" lnSpcReduction="20000"/>
           </a:bodyPr>
           <a:lstStyle/>
           <a:p>
@@ -10421,7 +10848,17 @@
             </a:pPr>
             <a:r>
               <a:rPr lang="en-US" dirty="0"/>
-              <a:t>A Process is started by </a:t>
+              <a:t>A Process:</a:t>
+            </a:r>
+          </a:p>
+          <a:p>
+            <a:pPr>
+              <a:buFontTx/>
+              <a:buChar char="-"/>
+            </a:pPr>
+            <a:r>
+              <a:rPr lang="en-US" dirty="0"/>
+              <a:t>Started by </a:t>
             </a:r>
             <a:r>
               <a:rPr lang="en-US" dirty="0" err="1"/>
@@ -10429,15 +10866,37 @@
             </a:r>
             <a:r>
               <a:rPr lang="en-US" dirty="0"/>
-              <a:t> executed by a parent process. </a:t>
-            </a:r>
-            <a:r>
-              <a:rPr lang="en-US" dirty="0" err="1"/>
-              <a:t>Syscall</a:t>
-            </a:r>
-            <a:r>
-              <a:rPr lang="en-US" dirty="0"/>
-              <a:t> is an API provided by the kernel for user-space programs to interact with it. A process runs a set of instructions as described by an ELF file. A process runs with resource limits inherited by parent or as set by the control group(s) it runs in. It also run optionally customized view of the system resources.</a:t>
+              <a:t>* executed by a parent process</a:t>
+            </a:r>
+          </a:p>
+          <a:p>
+            <a:pPr>
+              <a:buFontTx/>
+              <a:buChar char="-"/>
+            </a:pPr>
+            <a:r>
+              <a:rPr lang="en-US" dirty="0"/>
+              <a:t>runs a set of instructions as described by an ELF file. </a:t>
+            </a:r>
+          </a:p>
+          <a:p>
+            <a:pPr>
+              <a:buFontTx/>
+              <a:buChar char="-"/>
+            </a:pPr>
+            <a:r>
+              <a:rPr lang="en-US" dirty="0"/>
+              <a:t>runs with resource limits inherited by parent or as set by the control group(s) it runs in</a:t>
+            </a:r>
+          </a:p>
+          <a:p>
+            <a:pPr>
+              <a:buFontTx/>
+              <a:buChar char="-"/>
+            </a:pPr>
+            <a:r>
+              <a:rPr lang="en-US" dirty="0"/>
+              <a:t>also has an optionally customized view of the system resources.</a:t>
             </a:r>
           </a:p>
           <a:p>
@@ -10452,7 +10911,7 @@
             </a:pPr>
             <a:r>
               <a:rPr lang="en-US" dirty="0"/>
-              <a:t>Each process has it is own memory map and is represented in a –hashed –  linked list in kernel memory. Each process reference its representation via a reference saved at the topmost address of the process memory.</a:t>
+              <a:t>Each process has its own memory map and is represented in a –hashed –  linked list in kernel memory. Each process references its representation via a reference saved at the topmost address of the process memory.</a:t>
             </a:r>
           </a:p>
           <a:p>
@@ -10470,12 +10929,136 @@
               <a:t>Process can talk to each other via a well-defined set of IPC interfaces and tools.</a:t>
             </a:r>
           </a:p>
+          <a:p>
+            <a:pPr marL="0" indent="0">
+              <a:buNone/>
+            </a:pPr>
+            <a:endParaRPr lang="en-US" dirty="0"/>
+          </a:p>
+          <a:p>
+            <a:pPr marL="0" indent="0">
+              <a:buNone/>
+            </a:pPr>
+            <a:r>
+              <a:rPr lang="en-US" sz="2100" dirty="0"/>
+              <a:t>*</a:t>
+            </a:r>
+            <a:r>
+              <a:rPr lang="en-US" sz="2100" dirty="0" err="1"/>
+              <a:t>Syscall</a:t>
+            </a:r>
+            <a:r>
+              <a:rPr lang="en-US" sz="2100" dirty="0"/>
+              <a:t> is an API provided by the kernel for user-space programs to interact with it.</a:t>
+            </a:r>
+          </a:p>
         </p:txBody>
       </p:sp>
     </p:spTree>
     <p:extLst>
       <p:ext uri="{BB962C8B-B14F-4D97-AF65-F5344CB8AC3E}">
         <p14:creationId xmlns:p14="http://schemas.microsoft.com/office/powerpoint/2010/main" val="2176117901"/>
+      </p:ext>
+    </p:extLst>
+  </p:cSld>
+  <p:clrMapOvr>
+    <a:masterClrMapping/>
+  </p:clrMapOvr>
+</p:sld>
+</file>
+
+<file path=ppt/slides/slide22.xml><?xml version="1.0" encoding="utf-8"?>
+<p:sld xmlns:a="http://schemas.openxmlformats.org/drawingml/2006/main" xmlns:r="http://schemas.openxmlformats.org/officeDocument/2006/relationships" xmlns:p="http://schemas.openxmlformats.org/presentationml/2006/main">
+  <p:cSld>
+    <p:spTree>
+      <p:nvGrpSpPr>
+        <p:cNvPr id="1" name=""/>
+        <p:cNvGrpSpPr/>
+        <p:nvPr/>
+      </p:nvGrpSpPr>
+      <p:grpSpPr>
+        <a:xfrm>
+          <a:off x="0" y="0"/>
+          <a:ext cx="0" cy="0"/>
+          <a:chOff x="0" y="0"/>
+          <a:chExt cx="0" cy="0"/>
+        </a:xfrm>
+      </p:grpSpPr>
+      <p:sp>
+        <p:nvSpPr>
+          <p:cNvPr id="2" name="Title 1">
+            <a:extLst>
+              <a:ext uri="{FF2B5EF4-FFF2-40B4-BE49-F238E27FC236}">
+                <a16:creationId xmlns:a16="http://schemas.microsoft.com/office/drawing/2014/main" id="{FC6A5FEB-241A-FF42-A3EF-29DF514DBDE7}"/>
+              </a:ext>
+            </a:extLst>
+          </p:cNvPr>
+          <p:cNvSpPr>
+            <a:spLocks noGrp="1"/>
+          </p:cNvSpPr>
+          <p:nvPr>
+            <p:ph type="title"/>
+          </p:nvPr>
+        </p:nvSpPr>
+        <p:spPr/>
+        <p:txBody>
+          <a:bodyPr/>
+          <a:lstStyle/>
+          <a:p>
+            <a:r>
+              <a:rPr lang="en-US" dirty="0"/>
+              <a:t>Feedback</a:t>
+            </a:r>
+          </a:p>
+        </p:txBody>
+      </p:sp>
+      <p:sp>
+        <p:nvSpPr>
+          <p:cNvPr id="3" name="Content Placeholder 2">
+            <a:extLst>
+              <a:ext uri="{FF2B5EF4-FFF2-40B4-BE49-F238E27FC236}">
+                <a16:creationId xmlns:a16="http://schemas.microsoft.com/office/drawing/2014/main" id="{ECF221FA-1A72-EB41-B494-7AE1C357CCC9}"/>
+              </a:ext>
+            </a:extLst>
+          </p:cNvPr>
+          <p:cNvSpPr>
+            <a:spLocks noGrp="1"/>
+          </p:cNvSpPr>
+          <p:nvPr>
+            <p:ph idx="1"/>
+          </p:nvPr>
+        </p:nvSpPr>
+        <p:spPr/>
+        <p:txBody>
+          <a:bodyPr>
+            <a:normAutofit/>
+          </a:bodyPr>
+          <a:lstStyle/>
+          <a:p>
+            <a:pPr marL="0" indent="0">
+              <a:buNone/>
+            </a:pPr>
+            <a:r>
+              <a:rPr lang="en-US" dirty="0"/>
+              <a:t>Please send feedback to:</a:t>
+            </a:r>
+          </a:p>
+          <a:p>
+            <a:pPr marL="0" indent="0">
+              <a:buNone/>
+            </a:pPr>
+            <a:r>
+              <a:rPr lang="en-US" sz="2100"/>
+              <a:t>https://aka.ms/workingwithlinux/feedback</a:t>
+            </a:r>
+            <a:endParaRPr lang="en-US" sz="2100" dirty="0"/>
+          </a:p>
+        </p:txBody>
+      </p:sp>
+    </p:spTree>
+    <p:extLst>
+      <p:ext uri="{BB962C8B-B14F-4D97-AF65-F5344CB8AC3E}">
+        <p14:creationId xmlns:p14="http://schemas.microsoft.com/office/powerpoint/2010/main" val="2405958399"/>
       </p:ext>
     </p:extLst>
   </p:cSld>
@@ -10555,49 +11138,39 @@
           <a:p>
             <a:r>
               <a:rPr lang="en-US" dirty="0"/>
-              <a:t>Expected 10 Sessions* every ~ 2 weeks**. With amble time for Q/A towards the end of each session.</a:t>
-            </a:r>
-          </a:p>
-          <a:p>
-            <a:r>
-              <a:rPr lang="en-US" dirty="0"/>
-              <a:t>Demos and content will be </a:t>
+              <a:t>8 sessions – one a week.</a:t>
+            </a:r>
+          </a:p>
+          <a:p>
+            <a:r>
+              <a:rPr lang="en-US" dirty="0"/>
+              <a:t>With ample time for Q/A towards the end of each session.</a:t>
+            </a:r>
+          </a:p>
+          <a:p>
+            <a:r>
+              <a:rPr lang="en-US" dirty="0"/>
+              <a:t>Demos and content will be on Bootcamp ADO (we are looking at </a:t>
             </a:r>
             <a:r>
               <a:rPr lang="en-US" dirty="0" err="1"/>
-              <a:t>github.com</a:t>
-            </a:r>
-            <a:r>
-              <a:rPr lang="en-US" dirty="0"/>
-              <a:t>/</a:t>
-            </a:r>
-            <a:r>
-              <a:rPr lang="en-US" dirty="0" err="1"/>
-              <a:t>khenidak</a:t>
-            </a:r>
-            <a:r>
-              <a:rPr lang="en-US" dirty="0"/>
-              <a:t>/on-</a:t>
-            </a:r>
-            <a:r>
-              <a:rPr lang="en-US" dirty="0" err="1"/>
-              <a:t>linux</a:t>
-            </a:r>
-            <a:r>
-              <a:rPr lang="en-US" dirty="0"/>
-              <a:t> (until it finds its forever home). The first iteration will not have hands-on labs but there is something – hopefully – in the works.</a:t>
-            </a:r>
-          </a:p>
-          <a:p>
-            <a:r>
-              <a:rPr lang="en-US" dirty="0"/>
-              <a:t>Some (Most?) of demos are done in C to remove abstraction layers typically added by modern languages.</a:t>
-            </a:r>
-          </a:p>
-          <a:p>
-            <a:r>
-              <a:rPr lang="en-US" dirty="0"/>
-              <a:t>We will not cover everything Linux. But, for whatever we won’t cover we will provide some pointer for your continued “understanding” journey.</a:t>
+              <a:t>github</a:t>
+            </a:r>
+            <a:r>
+              <a:rPr lang="en-US" dirty="0"/>
+              <a:t> for long-term solution).</a:t>
+            </a:r>
+          </a:p>
+          <a:p>
+            <a:r>
+              <a:rPr lang="en-US" dirty="0"/>
+              <a:t>Most of demos are done in C to remove abstraction layers typically added by modern languages.</a:t>
+            </a:r>
+          </a:p>
+          <a:p>
+            <a:r>
+              <a:rPr lang="en-US" dirty="0"/>
+              <a:t>We will not cover everything Linux. But for whatever we won’t cover we will provide some pointer for your continued “understanding” journey.</a:t>
             </a:r>
           </a:p>
           <a:p>
@@ -10666,31 +11239,6 @@
           </a:p>
         </p:txBody>
       </p:sp>
-      <p:sp>
-        <p:nvSpPr>
-          <p:cNvPr id="5" name="Text Placeholder 4">
-            <a:extLst>
-              <a:ext uri="{FF2B5EF4-FFF2-40B4-BE49-F238E27FC236}">
-                <a16:creationId xmlns:a16="http://schemas.microsoft.com/office/drawing/2014/main" id="{694FDEF5-F247-3249-9C11-1168DF9D6A50}"/>
-              </a:ext>
-            </a:extLst>
-          </p:cNvPr>
-          <p:cNvSpPr>
-            <a:spLocks noGrp="1"/>
-          </p:cNvSpPr>
-          <p:nvPr>
-            <p:ph type="body" idx="1"/>
-          </p:nvPr>
-        </p:nvSpPr>
-        <p:spPr/>
-        <p:txBody>
-          <a:bodyPr/>
-          <a:lstStyle/>
-          <a:p>
-            <a:endParaRPr lang="en-US"/>
-          </a:p>
-        </p:txBody>
-      </p:sp>
     </p:spTree>
     <p:extLst>
       <p:ext uri="{BB962C8B-B14F-4D97-AF65-F5344CB8AC3E}">
@@ -10726,7 +11274,7 @@
           <p:cNvPr id="4" name="Title 3">
             <a:extLst>
               <a:ext uri="{FF2B5EF4-FFF2-40B4-BE49-F238E27FC236}">
-                <a16:creationId xmlns:a16="http://schemas.microsoft.com/office/drawing/2014/main" id="{E0DA33EF-25BA-6948-B687-B8F9EF09C0F0}"/>
+                <a16:creationId xmlns:a16="http://schemas.microsoft.com/office/drawing/2014/main" id="{BF05B798-F23E-5041-ABB0-88315EBAD287}"/>
               </a:ext>
             </a:extLst>
           </p:cNvPr>
@@ -10744,250 +11292,15 @@
           <a:p>
             <a:r>
               <a:rPr lang="en-US" dirty="0"/>
-              <a:t>Let there be “something”</a:t>
-            </a:r>
-          </a:p>
-        </p:txBody>
-      </p:sp>
-      <p:sp>
-        <p:nvSpPr>
-          <p:cNvPr id="5" name="Content Placeholder 4">
-            <a:extLst>
-              <a:ext uri="{FF2B5EF4-FFF2-40B4-BE49-F238E27FC236}">
-                <a16:creationId xmlns:a16="http://schemas.microsoft.com/office/drawing/2014/main" id="{3312133F-93C1-ED43-8673-E43AE7379D55}"/>
-              </a:ext>
-            </a:extLst>
-          </p:cNvPr>
-          <p:cNvSpPr>
-            <a:spLocks noGrp="1"/>
-          </p:cNvSpPr>
-          <p:nvPr>
-            <p:ph idx="1"/>
-          </p:nvPr>
-        </p:nvSpPr>
-        <p:spPr/>
-        <p:txBody>
-          <a:bodyPr>
-            <a:normAutofit fontScale="55000" lnSpcReduction="20000"/>
-          </a:bodyPr>
-          <a:lstStyle/>
-          <a:p>
-            <a:r>
-              <a:rPr lang="en-US" dirty="0"/>
-              <a:t>A computer that only runs “the kernel” does not really provide value for user (are there any exception to that? can you name one?).</a:t>
-            </a:r>
-          </a:p>
-          <a:p>
-            <a:r>
-              <a:rPr lang="en-US" dirty="0"/>
-              <a:t>Once kernel boot sequence is completed*, kernel executes </a:t>
-            </a:r>
-            <a:r>
-              <a:rPr lang="en-US" dirty="0" err="1"/>
-              <a:t>init</a:t>
-            </a:r>
-            <a:r>
-              <a:rPr lang="en-US" dirty="0"/>
-              <a:t> process. This “</a:t>
-            </a:r>
-            <a:r>
-              <a:rPr lang="en-US" dirty="0" err="1"/>
-              <a:t>init</a:t>
-            </a:r>
-            <a:r>
-              <a:rPr lang="en-US" dirty="0"/>
-              <a:t>” process is the “parent” and is responsible for running everything else. Exiting </a:t>
-            </a:r>
-            <a:r>
-              <a:rPr lang="en-US" dirty="0" err="1"/>
-              <a:t>init</a:t>
-            </a:r>
-            <a:r>
-              <a:rPr lang="en-US" dirty="0"/>
-              <a:t> exits the system.</a:t>
-            </a:r>
-          </a:p>
-          <a:p>
-            <a:r>
-              <a:rPr lang="en-US" dirty="0"/>
-              <a:t>Each process (including each thread) has a </a:t>
-            </a:r>
-            <a:r>
-              <a:rPr lang="en-US" b="1" i="1" dirty="0" err="1"/>
-              <a:t>pid</a:t>
-            </a:r>
-            <a:r>
-              <a:rPr lang="en-US" dirty="0"/>
-              <a:t> and </a:t>
-            </a:r>
-            <a:r>
-              <a:rPr lang="en-US" b="1" i="1" dirty="0" err="1"/>
-              <a:t>ppid</a:t>
-            </a:r>
-            <a:r>
-              <a:rPr lang="en-US" dirty="0"/>
-              <a:t>. Each process is represented as “</a:t>
-            </a:r>
-            <a:r>
-              <a:rPr lang="en-US" i="1" dirty="0"/>
-              <a:t>struct </a:t>
-            </a:r>
-            <a:r>
-              <a:rPr lang="en-US" i="1" dirty="0" err="1"/>
-              <a:t>task_struct</a:t>
-            </a:r>
-            <a:r>
-              <a:rPr lang="en-US" dirty="0"/>
-              <a:t>” in a doubly linked list inside the kernel. </a:t>
-            </a:r>
-          </a:p>
-          <a:p>
-            <a:r>
-              <a:rPr lang="en-US" dirty="0"/>
-              <a:t>Process come in sessions (w/ controlling terminal or not) and groups (multiple sessions). A process group can be signaled all at once (POSIX). </a:t>
-            </a:r>
-          </a:p>
-          <a:p>
-            <a:r>
-              <a:rPr lang="en-US" dirty="0"/>
-              <a:t>Think of an executing process as a giant “int main(..)” that has exit code. Parent must reap exit code for child. Kernel will not remove process info until it reaped. If not reaped it will become a zombie (and you don’t want those)</a:t>
-            </a:r>
-          </a:p>
-          <a:p>
-            <a:r>
-              <a:rPr lang="en-US" dirty="0"/>
-              <a:t>Like everything else a process is a state machine: </a:t>
-            </a:r>
-          </a:p>
-          <a:p>
-            <a:pPr lvl="1"/>
-            <a:r>
-              <a:rPr lang="en-US" b="1" dirty="0"/>
-              <a:t>R</a:t>
-            </a:r>
-            <a:r>
-              <a:rPr lang="en-US" dirty="0"/>
-              <a:t>unning/able || </a:t>
-            </a:r>
-            <a:r>
-              <a:rPr lang="en-US" b="1" dirty="0"/>
-              <a:t>S</a:t>
-            </a:r>
-            <a:r>
-              <a:rPr lang="en-US" dirty="0"/>
-              <a:t>leeping || </a:t>
-            </a:r>
-            <a:r>
-              <a:rPr lang="en-US" dirty="0" err="1"/>
-              <a:t>s</a:t>
-            </a:r>
-            <a:r>
-              <a:rPr lang="en-US" b="1" dirty="0" err="1"/>
-              <a:t>T</a:t>
-            </a:r>
-            <a:r>
-              <a:rPr lang="en-US" dirty="0" err="1"/>
-              <a:t>opped</a:t>
-            </a:r>
-            <a:r>
-              <a:rPr lang="en-US" dirty="0"/>
-              <a:t> || </a:t>
-            </a:r>
-            <a:r>
-              <a:rPr lang="en-US" b="1" dirty="0"/>
-              <a:t>Z</a:t>
-            </a:r>
-            <a:r>
-              <a:rPr lang="en-US" dirty="0"/>
-              <a:t>ombie || </a:t>
-            </a:r>
-            <a:r>
-              <a:rPr lang="en-US" b="1" dirty="0"/>
-              <a:t>D</a:t>
-            </a:r>
-            <a:r>
-              <a:rPr lang="en-US" dirty="0"/>
-              <a:t> (uninterruptable sleep) || </a:t>
-            </a:r>
-            <a:r>
-              <a:rPr lang="en-US" b="1" dirty="0"/>
-              <a:t>I</a:t>
-            </a:r>
-            <a:r>
-              <a:rPr lang="en-US" dirty="0"/>
-              <a:t> (idle filler)</a:t>
-            </a:r>
-          </a:p>
-          <a:p>
-            <a:pPr lvl="1"/>
-            <a:r>
-              <a:rPr lang="en-US" b="1" dirty="0"/>
-              <a:t>s</a:t>
-            </a:r>
-            <a:r>
-              <a:rPr lang="en-US" dirty="0"/>
-              <a:t> is for Session leader, </a:t>
-            </a:r>
-            <a:r>
-              <a:rPr lang="en-US" b="1" dirty="0"/>
-              <a:t>l (small l)</a:t>
-            </a:r>
-            <a:r>
-              <a:rPr lang="en-US" dirty="0"/>
-              <a:t> is for multi-threading </a:t>
-            </a:r>
-            <a:r>
-              <a:rPr lang="en-US" b="1" dirty="0"/>
-              <a:t>L</a:t>
-            </a:r>
-            <a:r>
-              <a:rPr lang="en-US" dirty="0"/>
-              <a:t> is for memory locking (i.e.,  no swapping*)</a:t>
-            </a:r>
-          </a:p>
-          <a:p>
-            <a:r>
-              <a:rPr lang="en-US" dirty="0"/>
-              <a:t>Linux “Program Loader” recognizes the following format</a:t>
-            </a:r>
-          </a:p>
-          <a:p>
-            <a:pPr lvl="1"/>
-            <a:r>
-              <a:rPr lang="en-US" dirty="0"/>
-              <a:t>ELF files</a:t>
-            </a:r>
-          </a:p>
-          <a:p>
-            <a:pPr lvl="1"/>
-            <a:r>
-              <a:rPr lang="en-US" dirty="0"/>
-              <a:t>Text Files via “shebang line” (pointing to ELF executable)</a:t>
-            </a:r>
-          </a:p>
-          <a:p>
-            <a:pPr lvl="1"/>
-            <a:r>
-              <a:rPr lang="en-US" dirty="0" err="1"/>
-              <a:t>binfmt_misc</a:t>
-            </a:r>
-            <a:r>
-              <a:rPr lang="en-US" dirty="0"/>
-              <a:t> which register other program loaders (ELF) to load other files -&gt; (MONO, QEMU and others use this clever trick).</a:t>
-            </a:r>
-          </a:p>
-          <a:p>
-            <a:pPr marL="457200" lvl="1" indent="0">
-              <a:buNone/>
-            </a:pPr>
-            <a:endParaRPr lang="en-US" dirty="0"/>
+              <a:t>Process: Modern Kernel View</a:t>
+            </a:r>
           </a:p>
         </p:txBody>
       </p:sp>
     </p:spTree>
     <p:extLst>
       <p:ext uri="{BB962C8B-B14F-4D97-AF65-F5344CB8AC3E}">
-        <p14:creationId xmlns:p14="http://schemas.microsoft.com/office/powerpoint/2010/main" val="839801836"/>
+        <p14:creationId xmlns:p14="http://schemas.microsoft.com/office/powerpoint/2010/main" val="2411632636"/>
       </p:ext>
     </p:extLst>
   </p:cSld>
@@ -11016,564 +11329,6 @@
       </p:grpSpPr>
       <p:sp>
         <p:nvSpPr>
-          <p:cNvPr id="4" name="Title 3">
-            <a:extLst>
-              <a:ext uri="{FF2B5EF4-FFF2-40B4-BE49-F238E27FC236}">
-                <a16:creationId xmlns:a16="http://schemas.microsoft.com/office/drawing/2014/main" id="{BF05B798-F23E-5041-ABB0-88315EBAD287}"/>
-              </a:ext>
-            </a:extLst>
-          </p:cNvPr>
-          <p:cNvSpPr>
-            <a:spLocks noGrp="1"/>
-          </p:cNvSpPr>
-          <p:nvPr>
-            <p:ph type="title"/>
-          </p:nvPr>
-        </p:nvSpPr>
-        <p:spPr/>
-        <p:txBody>
-          <a:bodyPr/>
-          <a:lstStyle/>
-          <a:p>
-            <a:r>
-              <a:rPr lang="en-US" dirty="0"/>
-              <a:t>Process: Modern Kernel View</a:t>
-            </a:r>
-          </a:p>
-        </p:txBody>
-      </p:sp>
-      <p:sp>
-        <p:nvSpPr>
-          <p:cNvPr id="5" name="Text Placeholder 4">
-            <a:extLst>
-              <a:ext uri="{FF2B5EF4-FFF2-40B4-BE49-F238E27FC236}">
-                <a16:creationId xmlns:a16="http://schemas.microsoft.com/office/drawing/2014/main" id="{190F90FF-C679-E449-A405-9944C76885AD}"/>
-              </a:ext>
-            </a:extLst>
-          </p:cNvPr>
-          <p:cNvSpPr>
-            <a:spLocks noGrp="1"/>
-          </p:cNvSpPr>
-          <p:nvPr>
-            <p:ph type="body" idx="1"/>
-          </p:nvPr>
-        </p:nvSpPr>
-        <p:spPr/>
-        <p:txBody>
-          <a:bodyPr/>
-          <a:lstStyle/>
-          <a:p>
-            <a:endParaRPr lang="en-US"/>
-          </a:p>
-        </p:txBody>
-      </p:sp>
-    </p:spTree>
-    <p:extLst>
-      <p:ext uri="{BB962C8B-B14F-4D97-AF65-F5344CB8AC3E}">
-        <p14:creationId xmlns:p14="http://schemas.microsoft.com/office/powerpoint/2010/main" val="2411632636"/>
-      </p:ext>
-    </p:extLst>
-  </p:cSld>
-  <p:clrMapOvr>
-    <a:masterClrMapping/>
-  </p:clrMapOvr>
-</p:sld>
-</file>
-
-<file path=ppt/slides/slide7.xml><?xml version="1.0" encoding="utf-8"?>
-<p:sld xmlns:a="http://schemas.openxmlformats.org/drawingml/2006/main" xmlns:r="http://schemas.openxmlformats.org/officeDocument/2006/relationships" xmlns:p="http://schemas.openxmlformats.org/presentationml/2006/main">
-  <p:cSld>
-    <p:spTree>
-      <p:nvGrpSpPr>
-        <p:cNvPr id="1" name=""/>
-        <p:cNvGrpSpPr/>
-        <p:nvPr/>
-      </p:nvGrpSpPr>
-      <p:grpSpPr>
-        <a:xfrm>
-          <a:off x="0" y="0"/>
-          <a:ext cx="0" cy="0"/>
-          <a:chOff x="0" y="0"/>
-          <a:chExt cx="0" cy="0"/>
-        </a:xfrm>
-      </p:grpSpPr>
-      <p:sp>
-        <p:nvSpPr>
-          <p:cNvPr id="2" name="Title 1">
-            <a:extLst>
-              <a:ext uri="{FF2B5EF4-FFF2-40B4-BE49-F238E27FC236}">
-                <a16:creationId xmlns:a16="http://schemas.microsoft.com/office/drawing/2014/main" id="{DA381AC1-370E-2C45-BF8B-D7ED12EAE200}"/>
-              </a:ext>
-            </a:extLst>
-          </p:cNvPr>
-          <p:cNvSpPr>
-            <a:spLocks noGrp="1"/>
-          </p:cNvSpPr>
-          <p:nvPr>
-            <p:ph type="title"/>
-          </p:nvPr>
-        </p:nvSpPr>
-        <p:spPr/>
-        <p:txBody>
-          <a:bodyPr/>
-          <a:lstStyle/>
-          <a:p>
-            <a:r>
-              <a:rPr lang="en-US" dirty="0"/>
-              <a:t>A Process Modern Kernel View</a:t>
-            </a:r>
-          </a:p>
-        </p:txBody>
-      </p:sp>
-      <p:sp>
-        <p:nvSpPr>
-          <p:cNvPr id="3" name="Content Placeholder 2">
-            <a:extLst>
-              <a:ext uri="{FF2B5EF4-FFF2-40B4-BE49-F238E27FC236}">
-                <a16:creationId xmlns:a16="http://schemas.microsoft.com/office/drawing/2014/main" id="{B2552CD2-3AE2-4C42-8429-42ABE27082EE}"/>
-              </a:ext>
-            </a:extLst>
-          </p:cNvPr>
-          <p:cNvSpPr>
-            <a:spLocks noGrp="1"/>
-          </p:cNvSpPr>
-          <p:nvPr>
-            <p:ph idx="1"/>
-          </p:nvPr>
-        </p:nvSpPr>
-        <p:spPr>
-          <a:xfrm>
-            <a:off x="838200" y="1825625"/>
-            <a:ext cx="7414544" cy="4351338"/>
-          </a:xfrm>
-        </p:spPr>
-        <p:txBody>
-          <a:bodyPr>
-            <a:normAutofit fontScale="92500" lnSpcReduction="20000"/>
-          </a:bodyPr>
-          <a:lstStyle/>
-          <a:p>
-            <a:pPr marL="285750" indent="-285750">
-              <a:buFont typeface="Arial" panose="020B0604020202020204" pitchFamily="34" charset="0"/>
-              <a:buChar char="•"/>
-            </a:pPr>
-            <a:r>
-              <a:rPr lang="en-US" dirty="0"/>
-              <a:t>Starts by </a:t>
-            </a:r>
-            <a:r>
-              <a:rPr lang="en-US" b="1" i="1" u="sng" dirty="0" err="1"/>
-              <a:t>syscalls</a:t>
-            </a:r>
-            <a:r>
-              <a:rPr lang="en-US" b="1" dirty="0"/>
-              <a:t> </a:t>
-            </a:r>
-            <a:r>
-              <a:rPr lang="en-US" dirty="0"/>
-              <a:t>executed by the parent process.</a:t>
-            </a:r>
-          </a:p>
-          <a:p>
-            <a:pPr marL="285750" indent="-285750">
-              <a:buFont typeface="Arial" panose="020B0604020202020204" pitchFamily="34" charset="0"/>
-              <a:buChar char="•"/>
-            </a:pPr>
-            <a:r>
-              <a:rPr lang="en-US" dirty="0"/>
-              <a:t>Bound to a </a:t>
-            </a:r>
-            <a:r>
-              <a:rPr lang="en-US" b="1" i="1" dirty="0"/>
-              <a:t>set of </a:t>
-            </a:r>
-            <a:r>
-              <a:rPr lang="en-US" b="1" i="1" dirty="0" err="1"/>
-              <a:t>cpus</a:t>
-            </a:r>
-            <a:r>
-              <a:rPr lang="en-US" dirty="0"/>
-              <a:t> (typically all) unless some are masked out. And has a ”nice” value describing scheduling priority*</a:t>
-            </a:r>
-          </a:p>
-          <a:p>
-            <a:pPr marL="285750" indent="-285750">
-              <a:buFont typeface="Arial" panose="020B0604020202020204" pitchFamily="34" charset="0"/>
-              <a:buChar char="•"/>
-            </a:pPr>
-            <a:r>
-              <a:rPr lang="en-US" dirty="0"/>
-              <a:t>Runs as the </a:t>
-            </a:r>
-            <a:r>
-              <a:rPr lang="en-US" b="1" i="1" dirty="0"/>
-              <a:t>user who started </a:t>
-            </a:r>
-            <a:r>
-              <a:rPr lang="en-US" dirty="0"/>
-              <a:t>it (or its parent) or the </a:t>
-            </a:r>
-            <a:r>
-              <a:rPr lang="en-US" b="1" dirty="0"/>
-              <a:t>user who created the executable (</a:t>
-            </a:r>
-            <a:r>
-              <a:rPr lang="en-US" b="1" dirty="0" err="1"/>
-              <a:t>setuid</a:t>
-            </a:r>
-            <a:r>
-              <a:rPr lang="en-US" b="1" dirty="0"/>
-              <a:t>(2) </a:t>
-            </a:r>
-            <a:r>
-              <a:rPr lang="en-US" b="1" dirty="0" err="1"/>
-              <a:t>setgid</a:t>
-            </a:r>
-            <a:r>
-              <a:rPr lang="en-US" b="1" dirty="0"/>
-              <a:t>(2))</a:t>
-            </a:r>
-            <a:r>
-              <a:rPr lang="en-US" dirty="0"/>
-              <a:t>.</a:t>
-            </a:r>
-          </a:p>
-          <a:p>
-            <a:pPr marL="285750" indent="-285750">
-              <a:buFont typeface="Arial" panose="020B0604020202020204" pitchFamily="34" charset="0"/>
-              <a:buChar char="•"/>
-            </a:pPr>
-            <a:r>
-              <a:rPr lang="en-US" dirty="0"/>
-              <a:t>Automatically gets:</a:t>
-            </a:r>
-          </a:p>
-          <a:p>
-            <a:pPr marL="742950" lvl="1" indent="-285750">
-              <a:buFont typeface="Arial" panose="020B0604020202020204" pitchFamily="34" charset="0"/>
-              <a:buChar char="•"/>
-            </a:pPr>
-            <a:r>
-              <a:rPr lang="en-US" b="1" dirty="0"/>
-              <a:t>FDs:</a:t>
-            </a:r>
-            <a:r>
-              <a:rPr lang="en-US" dirty="0"/>
-              <a:t> stdin, </a:t>
-            </a:r>
-            <a:r>
-              <a:rPr lang="en-US" dirty="0" err="1"/>
-              <a:t>stdout</a:t>
-            </a:r>
-            <a:r>
-              <a:rPr lang="en-US" dirty="0"/>
-              <a:t>, stderr</a:t>
-            </a:r>
-          </a:p>
-          <a:p>
-            <a:pPr marL="742950" lvl="1" indent="-285750">
-              <a:buFont typeface="Arial" panose="020B0604020202020204" pitchFamily="34" charset="0"/>
-              <a:buChar char="•"/>
-            </a:pPr>
-            <a:r>
-              <a:rPr lang="en-US" dirty="0"/>
-              <a:t>TTY</a:t>
-            </a:r>
-          </a:p>
-          <a:p>
-            <a:pPr marL="285750" indent="-285750">
-              <a:buFont typeface="Arial" panose="020B0604020202020204" pitchFamily="34" charset="0"/>
-              <a:buChar char="•"/>
-            </a:pPr>
-            <a:r>
-              <a:rPr lang="en-US" dirty="0"/>
-              <a:t>A </a:t>
-            </a:r>
-            <a:r>
-              <a:rPr lang="en-US" b="1" dirty="0"/>
-              <a:t>unique memory address</a:t>
-            </a:r>
-            <a:r>
-              <a:rPr lang="en-US" dirty="0"/>
-              <a:t> space (aka proc mem-map, not to be confused with </a:t>
-            </a:r>
-            <a:r>
-              <a:rPr lang="en-US" b="1" dirty="0" err="1"/>
-              <a:t>mmap</a:t>
-            </a:r>
-            <a:r>
-              <a:rPr lang="en-US" b="1" dirty="0"/>
-              <a:t>(2)</a:t>
-            </a:r>
-            <a:r>
-              <a:rPr lang="en-US" dirty="0"/>
-              <a:t>).</a:t>
-            </a:r>
-          </a:p>
-        </p:txBody>
-      </p:sp>
-      <p:sp>
-        <p:nvSpPr>
-          <p:cNvPr id="4" name="Rounded Rectangle 3">
-            <a:extLst>
-              <a:ext uri="{FF2B5EF4-FFF2-40B4-BE49-F238E27FC236}">
-                <a16:creationId xmlns:a16="http://schemas.microsoft.com/office/drawing/2014/main" id="{0A5E5CC6-C40A-D74A-9E9C-A64A5703BDA7}"/>
-              </a:ext>
-            </a:extLst>
-          </p:cNvPr>
-          <p:cNvSpPr/>
-          <p:nvPr/>
-        </p:nvSpPr>
-        <p:spPr>
-          <a:xfrm>
-            <a:off x="9156834" y="752354"/>
-            <a:ext cx="2534856" cy="717630"/>
-          </a:xfrm>
-          <a:prstGeom prst="roundRect">
-            <a:avLst>
-              <a:gd name="adj" fmla="val 5377"/>
-            </a:avLst>
-          </a:prstGeom>
-        </p:spPr>
-        <p:style>
-          <a:lnRef idx="2">
-            <a:schemeClr val="accent1">
-              <a:shade val="50000"/>
-            </a:schemeClr>
-          </a:lnRef>
-          <a:fillRef idx="1">
-            <a:schemeClr val="accent1"/>
-          </a:fillRef>
-          <a:effectRef idx="0">
-            <a:schemeClr val="accent1"/>
-          </a:effectRef>
-          <a:fontRef idx="minor">
-            <a:schemeClr val="lt1"/>
-          </a:fontRef>
-        </p:style>
-        <p:txBody>
-          <a:bodyPr rtlCol="0" anchor="ctr"/>
-          <a:lstStyle/>
-          <a:p>
-            <a:pPr algn="ctr"/>
-            <a:r>
-              <a:rPr lang="en-US" dirty="0"/>
-              <a:t>Parent</a:t>
-            </a:r>
-          </a:p>
-        </p:txBody>
-      </p:sp>
-      <p:sp>
-        <p:nvSpPr>
-          <p:cNvPr id="5" name="Rounded Rectangle 4">
-            <a:extLst>
-              <a:ext uri="{FF2B5EF4-FFF2-40B4-BE49-F238E27FC236}">
-                <a16:creationId xmlns:a16="http://schemas.microsoft.com/office/drawing/2014/main" id="{BD9F6841-4E8D-6E4B-9C2B-759AAE94F3F4}"/>
-              </a:ext>
-            </a:extLst>
-          </p:cNvPr>
-          <p:cNvSpPr/>
-          <p:nvPr/>
-        </p:nvSpPr>
-        <p:spPr>
-          <a:xfrm>
-            <a:off x="9156834" y="2853159"/>
-            <a:ext cx="2534856" cy="717630"/>
-          </a:xfrm>
-          <a:prstGeom prst="roundRect">
-            <a:avLst>
-              <a:gd name="adj" fmla="val 5377"/>
-            </a:avLst>
-          </a:prstGeom>
-        </p:spPr>
-        <p:style>
-          <a:lnRef idx="2">
-            <a:schemeClr val="accent1">
-              <a:shade val="50000"/>
-            </a:schemeClr>
-          </a:lnRef>
-          <a:fillRef idx="1">
-            <a:schemeClr val="accent1"/>
-          </a:fillRef>
-          <a:effectRef idx="0">
-            <a:schemeClr val="accent1"/>
-          </a:effectRef>
-          <a:fontRef idx="minor">
-            <a:schemeClr val="lt1"/>
-          </a:fontRef>
-        </p:style>
-        <p:txBody>
-          <a:bodyPr rtlCol="0" anchor="ctr"/>
-          <a:lstStyle/>
-          <a:p>
-            <a:pPr algn="ctr"/>
-            <a:r>
-              <a:rPr lang="en-US" dirty="0"/>
-              <a:t>Process</a:t>
-            </a:r>
-          </a:p>
-        </p:txBody>
-      </p:sp>
-      <p:cxnSp>
-        <p:nvCxnSpPr>
-          <p:cNvPr id="6" name="Straight Arrow Connector 5">
-            <a:extLst>
-              <a:ext uri="{FF2B5EF4-FFF2-40B4-BE49-F238E27FC236}">
-                <a16:creationId xmlns:a16="http://schemas.microsoft.com/office/drawing/2014/main" id="{F61CEAB0-6E6C-9D4E-AC93-D9EC35826B98}"/>
-              </a:ext>
-            </a:extLst>
-          </p:cNvPr>
-          <p:cNvCxnSpPr>
-            <a:stCxn id="4" idx="2"/>
-            <a:endCxn id="5" idx="0"/>
-          </p:cNvCxnSpPr>
-          <p:nvPr/>
-        </p:nvCxnSpPr>
-        <p:spPr>
-          <a:xfrm>
-            <a:off x="10424262" y="1469984"/>
-            <a:ext cx="0" cy="1383175"/>
-          </a:xfrm>
-          <a:prstGeom prst="straightConnector1">
-            <a:avLst/>
-          </a:prstGeom>
-          <a:ln w="28575">
-            <a:tailEnd type="triangle"/>
-          </a:ln>
-        </p:spPr>
-        <p:style>
-          <a:lnRef idx="1">
-            <a:schemeClr val="accent1"/>
-          </a:lnRef>
-          <a:fillRef idx="0">
-            <a:schemeClr val="accent1"/>
-          </a:fillRef>
-          <a:effectRef idx="0">
-            <a:schemeClr val="accent1"/>
-          </a:effectRef>
-          <a:fontRef idx="minor">
-            <a:schemeClr val="tx1"/>
-          </a:fontRef>
-        </p:style>
-      </p:cxnSp>
-      <p:sp>
-        <p:nvSpPr>
-          <p:cNvPr id="7" name="TextBox 6">
-            <a:extLst>
-              <a:ext uri="{FF2B5EF4-FFF2-40B4-BE49-F238E27FC236}">
-                <a16:creationId xmlns:a16="http://schemas.microsoft.com/office/drawing/2014/main" id="{3F90B440-580E-334C-9943-777C4DAC7D68}"/>
-              </a:ext>
-            </a:extLst>
-          </p:cNvPr>
-          <p:cNvSpPr txBox="1"/>
-          <p:nvPr/>
-        </p:nvSpPr>
-        <p:spPr>
-          <a:xfrm>
-            <a:off x="9387169" y="1825625"/>
-            <a:ext cx="806759" cy="830997"/>
-          </a:xfrm>
-          <a:prstGeom prst="rect">
-            <a:avLst/>
-          </a:prstGeom>
-          <a:noFill/>
-        </p:spPr>
-        <p:txBody>
-          <a:bodyPr wrap="none" rtlCol="0">
-            <a:spAutoFit/>
-          </a:bodyPr>
-          <a:lstStyle/>
-          <a:p>
-            <a:r>
-              <a:rPr lang="en-US" sz="1200" i="1" dirty="0"/>
-              <a:t>fork(2) </a:t>
-            </a:r>
-          </a:p>
-          <a:p>
-            <a:r>
-              <a:rPr lang="en-US" sz="1200" i="1" dirty="0"/>
-              <a:t>clone(2)</a:t>
-            </a:r>
-            <a:br>
-              <a:rPr lang="en-US" sz="1200" i="1" dirty="0"/>
-            </a:br>
-            <a:r>
-              <a:rPr lang="en-US" sz="1200" i="1" dirty="0"/>
-              <a:t>execve(2) </a:t>
-            </a:r>
-          </a:p>
-          <a:p>
-            <a:r>
-              <a:rPr lang="en-US" sz="1200" i="1" dirty="0"/>
-              <a:t>exec(2)</a:t>
-            </a:r>
-          </a:p>
-        </p:txBody>
-      </p:sp>
-      <p:sp>
-        <p:nvSpPr>
-          <p:cNvPr id="8" name="TextBox 7">
-            <a:extLst>
-              <a:ext uri="{FF2B5EF4-FFF2-40B4-BE49-F238E27FC236}">
-                <a16:creationId xmlns:a16="http://schemas.microsoft.com/office/drawing/2014/main" id="{6101D7F4-B672-AF4B-AB98-CFD60ED56864}"/>
-              </a:ext>
-            </a:extLst>
-          </p:cNvPr>
-          <p:cNvSpPr txBox="1"/>
-          <p:nvPr/>
-        </p:nvSpPr>
-        <p:spPr>
-          <a:xfrm>
-            <a:off x="3055716" y="636608"/>
-            <a:ext cx="184731" cy="369332"/>
-          </a:xfrm>
-          <a:prstGeom prst="rect">
-            <a:avLst/>
-          </a:prstGeom>
-          <a:noFill/>
-        </p:spPr>
-        <p:txBody>
-          <a:bodyPr wrap="none" rtlCol="0">
-            <a:spAutoFit/>
-          </a:bodyPr>
-          <a:lstStyle/>
-          <a:p>
-            <a:endParaRPr lang="en-US" dirty="0"/>
-          </a:p>
-        </p:txBody>
-      </p:sp>
-    </p:spTree>
-    <p:extLst>
-      <p:ext uri="{BB962C8B-B14F-4D97-AF65-F5344CB8AC3E}">
-        <p14:creationId xmlns:p14="http://schemas.microsoft.com/office/powerpoint/2010/main" val="3357472567"/>
-      </p:ext>
-    </p:extLst>
-  </p:cSld>
-  <p:clrMapOvr>
-    <a:masterClrMapping/>
-  </p:clrMapOvr>
-</p:sld>
-</file>
-
-<file path=ppt/slides/slide8.xml><?xml version="1.0" encoding="utf-8"?>
-<p:sld xmlns:a="http://schemas.openxmlformats.org/drawingml/2006/main" xmlns:r="http://schemas.openxmlformats.org/officeDocument/2006/relationships" xmlns:p="http://schemas.openxmlformats.org/presentationml/2006/main">
-  <p:cSld>
-    <p:spTree>
-      <p:nvGrpSpPr>
-        <p:cNvPr id="1" name=""/>
-        <p:cNvGrpSpPr/>
-        <p:nvPr/>
-      </p:nvGrpSpPr>
-      <p:grpSpPr>
-        <a:xfrm>
-          <a:off x="0" y="0"/>
-          <a:ext cx="0" cy="0"/>
-          <a:chOff x="0" y="0"/>
-          <a:chExt cx="0" cy="0"/>
-        </a:xfrm>
-      </p:grpSpPr>
-      <p:sp>
-        <p:nvSpPr>
           <p:cNvPr id="2" name="Title 1">
             <a:extLst>
               <a:ext uri="{FF2B5EF4-FFF2-40B4-BE49-F238E27FC236}">
@@ -11646,7 +11401,7 @@
             </a:r>
             <a:r>
               <a:rPr lang="en-US" b="1" i="1" dirty="0"/>
-              <a:t>process Management compartmentalization</a:t>
+              <a:t>process Management + compartmentalization</a:t>
             </a:r>
             <a:r>
               <a:rPr lang="en-US" dirty="0"/>
@@ -11756,7 +11511,7 @@
           <a:p>
             <a:r>
               <a:rPr lang="en-US" dirty="0"/>
-              <a:t>Kernel does no provide “call back” mechanism. But it can send signals to process or a group of them.</a:t>
+              <a:t>Kernel does not provide “call back” mechanism*. But it can send signals to process or a group of them.</a:t>
             </a:r>
           </a:p>
           <a:p>
@@ -12244,7 +11999,7 @@
 </p:sld>
 </file>
 
-<file path=ppt/slides/slide9.xml><?xml version="1.0" encoding="utf-8"?>
+<file path=ppt/slides/slide7.xml><?xml version="1.0" encoding="utf-8"?>
 <p:sld xmlns:a="http://schemas.openxmlformats.org/drawingml/2006/main" xmlns:r="http://schemas.openxmlformats.org/officeDocument/2006/relationships" xmlns:p="http://schemas.openxmlformats.org/presentationml/2006/main">
   <p:cSld>
     <p:spTree>
@@ -12842,6 +12597,768 @@
     <p:extLst>
       <p:ext uri="{BB962C8B-B14F-4D97-AF65-F5344CB8AC3E}">
         <p14:creationId xmlns:p14="http://schemas.microsoft.com/office/powerpoint/2010/main" val="1250210389"/>
+      </p:ext>
+    </p:extLst>
+  </p:cSld>
+  <p:clrMapOvr>
+    <a:masterClrMapping/>
+  </p:clrMapOvr>
+</p:sld>
+</file>
+
+<file path=ppt/slides/slide8.xml><?xml version="1.0" encoding="utf-8"?>
+<p:sld xmlns:a="http://schemas.openxmlformats.org/drawingml/2006/main" xmlns:r="http://schemas.openxmlformats.org/officeDocument/2006/relationships" xmlns:p="http://schemas.openxmlformats.org/presentationml/2006/main">
+  <p:cSld>
+    <p:spTree>
+      <p:nvGrpSpPr>
+        <p:cNvPr id="1" name=""/>
+        <p:cNvGrpSpPr/>
+        <p:nvPr/>
+      </p:nvGrpSpPr>
+      <p:grpSpPr>
+        <a:xfrm>
+          <a:off x="0" y="0"/>
+          <a:ext cx="0" cy="0"/>
+          <a:chOff x="0" y="0"/>
+          <a:chExt cx="0" cy="0"/>
+        </a:xfrm>
+      </p:grpSpPr>
+      <p:sp>
+        <p:nvSpPr>
+          <p:cNvPr id="4" name="Title 3">
+            <a:extLst>
+              <a:ext uri="{FF2B5EF4-FFF2-40B4-BE49-F238E27FC236}">
+                <a16:creationId xmlns:a16="http://schemas.microsoft.com/office/drawing/2014/main" id="{E0DA33EF-25BA-6948-B687-B8F9EF09C0F0}"/>
+              </a:ext>
+            </a:extLst>
+          </p:cNvPr>
+          <p:cNvSpPr>
+            <a:spLocks noGrp="1"/>
+          </p:cNvSpPr>
+          <p:nvPr>
+            <p:ph type="title"/>
+          </p:nvPr>
+        </p:nvSpPr>
+        <p:spPr/>
+        <p:txBody>
+          <a:bodyPr/>
+          <a:lstStyle/>
+          <a:p>
+            <a:r>
+              <a:rPr lang="en-US" dirty="0"/>
+              <a:t>Let there be “something”</a:t>
+            </a:r>
+          </a:p>
+        </p:txBody>
+      </p:sp>
+      <p:sp>
+        <p:nvSpPr>
+          <p:cNvPr id="5" name="Content Placeholder 4">
+            <a:extLst>
+              <a:ext uri="{FF2B5EF4-FFF2-40B4-BE49-F238E27FC236}">
+                <a16:creationId xmlns:a16="http://schemas.microsoft.com/office/drawing/2014/main" id="{3312133F-93C1-ED43-8673-E43AE7379D55}"/>
+              </a:ext>
+            </a:extLst>
+          </p:cNvPr>
+          <p:cNvSpPr>
+            <a:spLocks noGrp="1"/>
+          </p:cNvSpPr>
+          <p:nvPr>
+            <p:ph idx="1"/>
+          </p:nvPr>
+        </p:nvSpPr>
+        <p:spPr/>
+        <p:txBody>
+          <a:bodyPr>
+            <a:normAutofit fontScale="55000" lnSpcReduction="20000"/>
+          </a:bodyPr>
+          <a:lstStyle/>
+          <a:p>
+            <a:r>
+              <a:rPr lang="en-US" dirty="0"/>
+              <a:t>A computer that only runs “the kernel” does not really provide value for user – why?</a:t>
+            </a:r>
+          </a:p>
+          <a:p>
+            <a:r>
+              <a:rPr lang="en-US" dirty="0"/>
+              <a:t>Once kernel boot sequence is completed*, kernel executes </a:t>
+            </a:r>
+            <a:r>
+              <a:rPr lang="en-US" dirty="0" err="1"/>
+              <a:t>init</a:t>
+            </a:r>
+            <a:r>
+              <a:rPr lang="en-US" dirty="0"/>
+              <a:t> process. This “</a:t>
+            </a:r>
+            <a:r>
+              <a:rPr lang="en-US" dirty="0" err="1"/>
+              <a:t>init</a:t>
+            </a:r>
+            <a:r>
+              <a:rPr lang="en-US" dirty="0"/>
+              <a:t>” process is the “parent” and is responsible for running everything else. Exiting </a:t>
+            </a:r>
+            <a:r>
+              <a:rPr lang="en-US" dirty="0" err="1"/>
+              <a:t>init</a:t>
+            </a:r>
+            <a:r>
+              <a:rPr lang="en-US" dirty="0"/>
+              <a:t> exits the system.</a:t>
+            </a:r>
+          </a:p>
+          <a:p>
+            <a:r>
+              <a:rPr lang="en-US" dirty="0"/>
+              <a:t>Each process (including each thread) has a </a:t>
+            </a:r>
+            <a:r>
+              <a:rPr lang="en-US" b="1" i="1" dirty="0" err="1"/>
+              <a:t>pid</a:t>
+            </a:r>
+            <a:r>
+              <a:rPr lang="en-US" dirty="0"/>
+              <a:t> and </a:t>
+            </a:r>
+            <a:r>
+              <a:rPr lang="en-US" b="1" i="1" dirty="0" err="1"/>
+              <a:t>ppid</a:t>
+            </a:r>
+            <a:r>
+              <a:rPr lang="en-US" dirty="0"/>
+              <a:t>. Each process is represented as “</a:t>
+            </a:r>
+            <a:r>
+              <a:rPr lang="en-US" i="1" dirty="0"/>
+              <a:t>struct </a:t>
+            </a:r>
+            <a:r>
+              <a:rPr lang="en-US" i="1" dirty="0" err="1"/>
+              <a:t>task_struct</a:t>
+            </a:r>
+            <a:r>
+              <a:rPr lang="en-US" dirty="0"/>
+              <a:t>” in a doubly linked list inside the kernel. </a:t>
+            </a:r>
+          </a:p>
+          <a:p>
+            <a:r>
+              <a:rPr lang="en-US" dirty="0"/>
+              <a:t>Process come in sessions (w/ controlling terminal or not) and groups (multiple sessions). A process group can be signaled all at once (POSIX). </a:t>
+            </a:r>
+          </a:p>
+          <a:p>
+            <a:r>
+              <a:rPr lang="en-US" dirty="0"/>
+              <a:t>Think of an executing process as a giant “int main(..)” that has exit code. Parent must reap exit code for child. Kernel will not remove process info until it reaped. If not reaped it will become a zombie (and you don’t want those).</a:t>
+            </a:r>
+          </a:p>
+          <a:p>
+            <a:r>
+              <a:rPr lang="en-US" dirty="0"/>
+              <a:t>Like everything else a process is a state machine:</a:t>
+            </a:r>
+          </a:p>
+          <a:p>
+            <a:pPr lvl="1"/>
+            <a:r>
+              <a:rPr lang="en-US" b="1" dirty="0"/>
+              <a:t>R</a:t>
+            </a:r>
+            <a:r>
+              <a:rPr lang="en-US" dirty="0"/>
+              <a:t>unning/able || </a:t>
+            </a:r>
+            <a:r>
+              <a:rPr lang="en-US" b="1" dirty="0"/>
+              <a:t>S</a:t>
+            </a:r>
+            <a:r>
+              <a:rPr lang="en-US" dirty="0"/>
+              <a:t>leeping || </a:t>
+            </a:r>
+            <a:r>
+              <a:rPr lang="en-US" dirty="0" err="1"/>
+              <a:t>s</a:t>
+            </a:r>
+            <a:r>
+              <a:rPr lang="en-US" b="1" dirty="0" err="1"/>
+              <a:t>T</a:t>
+            </a:r>
+            <a:r>
+              <a:rPr lang="en-US" dirty="0" err="1"/>
+              <a:t>opped</a:t>
+            </a:r>
+            <a:r>
+              <a:rPr lang="en-US" dirty="0"/>
+              <a:t> || </a:t>
+            </a:r>
+            <a:r>
+              <a:rPr lang="en-US" b="1" dirty="0"/>
+              <a:t>Z</a:t>
+            </a:r>
+            <a:r>
+              <a:rPr lang="en-US" dirty="0"/>
+              <a:t>ombie || </a:t>
+            </a:r>
+            <a:r>
+              <a:rPr lang="en-US" b="1" dirty="0"/>
+              <a:t>D</a:t>
+            </a:r>
+            <a:r>
+              <a:rPr lang="en-US" dirty="0"/>
+              <a:t> (uninterruptable sleep) || </a:t>
+            </a:r>
+            <a:r>
+              <a:rPr lang="en-US" b="1" dirty="0"/>
+              <a:t>I</a:t>
+            </a:r>
+            <a:r>
+              <a:rPr lang="en-US" dirty="0"/>
+              <a:t> (idle filler)</a:t>
+            </a:r>
+          </a:p>
+          <a:p>
+            <a:pPr lvl="1"/>
+            <a:r>
+              <a:rPr lang="en-US" b="1" dirty="0"/>
+              <a:t>s</a:t>
+            </a:r>
+            <a:r>
+              <a:rPr lang="en-US" dirty="0"/>
+              <a:t> is for Session leader, </a:t>
+            </a:r>
+            <a:r>
+              <a:rPr lang="en-US" b="1" dirty="0"/>
+              <a:t>l (small l)</a:t>
+            </a:r>
+            <a:r>
+              <a:rPr lang="en-US" dirty="0"/>
+              <a:t> is for multi-threading </a:t>
+            </a:r>
+            <a:r>
+              <a:rPr lang="en-US" b="1" dirty="0"/>
+              <a:t>L</a:t>
+            </a:r>
+            <a:r>
+              <a:rPr lang="en-US" dirty="0"/>
+              <a:t> is for memory locking (i.e.,  no swapping*)</a:t>
+            </a:r>
+          </a:p>
+          <a:p>
+            <a:r>
+              <a:rPr lang="en-US" dirty="0"/>
+              <a:t>Linux “Program Loader” recognizes the following format</a:t>
+            </a:r>
+          </a:p>
+          <a:p>
+            <a:pPr lvl="1"/>
+            <a:r>
+              <a:rPr lang="en-US" dirty="0"/>
+              <a:t>ELF files</a:t>
+            </a:r>
+          </a:p>
+          <a:p>
+            <a:pPr lvl="1"/>
+            <a:r>
+              <a:rPr lang="en-US" dirty="0"/>
+              <a:t>Text Files via “shebang line” (pointing to ELF executable)</a:t>
+            </a:r>
+          </a:p>
+          <a:p>
+            <a:pPr lvl="1"/>
+            <a:r>
+              <a:rPr lang="en-US" dirty="0" err="1"/>
+              <a:t>binfmt_misc</a:t>
+            </a:r>
+            <a:r>
+              <a:rPr lang="en-US" dirty="0"/>
+              <a:t> which register other program loaders (ELF) to load other files -&gt; (MONO, QEMU and others use this clever trick).</a:t>
+            </a:r>
+          </a:p>
+        </p:txBody>
+      </p:sp>
+    </p:spTree>
+    <p:extLst>
+      <p:ext uri="{BB962C8B-B14F-4D97-AF65-F5344CB8AC3E}">
+        <p14:creationId xmlns:p14="http://schemas.microsoft.com/office/powerpoint/2010/main" val="839801836"/>
+      </p:ext>
+    </p:extLst>
+  </p:cSld>
+  <p:clrMapOvr>
+    <a:masterClrMapping/>
+  </p:clrMapOvr>
+</p:sld>
+</file>
+
+<file path=ppt/slides/slide9.xml><?xml version="1.0" encoding="utf-8"?>
+<p:sld xmlns:a="http://schemas.openxmlformats.org/drawingml/2006/main" xmlns:r="http://schemas.openxmlformats.org/officeDocument/2006/relationships" xmlns:p="http://schemas.openxmlformats.org/presentationml/2006/main">
+  <p:cSld>
+    <p:spTree>
+      <p:nvGrpSpPr>
+        <p:cNvPr id="1" name=""/>
+        <p:cNvGrpSpPr/>
+        <p:nvPr/>
+      </p:nvGrpSpPr>
+      <p:grpSpPr>
+        <a:xfrm>
+          <a:off x="0" y="0"/>
+          <a:ext cx="0" cy="0"/>
+          <a:chOff x="0" y="0"/>
+          <a:chExt cx="0" cy="0"/>
+        </a:xfrm>
+      </p:grpSpPr>
+      <p:sp>
+        <p:nvSpPr>
+          <p:cNvPr id="2" name="Title 1">
+            <a:extLst>
+              <a:ext uri="{FF2B5EF4-FFF2-40B4-BE49-F238E27FC236}">
+                <a16:creationId xmlns:a16="http://schemas.microsoft.com/office/drawing/2014/main" id="{DA381AC1-370E-2C45-BF8B-D7ED12EAE200}"/>
+              </a:ext>
+            </a:extLst>
+          </p:cNvPr>
+          <p:cNvSpPr>
+            <a:spLocks noGrp="1"/>
+          </p:cNvSpPr>
+          <p:nvPr>
+            <p:ph type="title"/>
+          </p:nvPr>
+        </p:nvSpPr>
+        <p:spPr/>
+        <p:txBody>
+          <a:bodyPr/>
+          <a:lstStyle/>
+          <a:p>
+            <a:r>
+              <a:rPr lang="en-US" dirty="0"/>
+              <a:t>A Process Modern Kernel View</a:t>
+            </a:r>
+          </a:p>
+        </p:txBody>
+      </p:sp>
+      <p:sp>
+        <p:nvSpPr>
+          <p:cNvPr id="3" name="Content Placeholder 2">
+            <a:extLst>
+              <a:ext uri="{FF2B5EF4-FFF2-40B4-BE49-F238E27FC236}">
+                <a16:creationId xmlns:a16="http://schemas.microsoft.com/office/drawing/2014/main" id="{B2552CD2-3AE2-4C42-8429-42ABE27082EE}"/>
+              </a:ext>
+            </a:extLst>
+          </p:cNvPr>
+          <p:cNvSpPr>
+            <a:spLocks noGrp="1"/>
+          </p:cNvSpPr>
+          <p:nvPr>
+            <p:ph idx="1"/>
+          </p:nvPr>
+        </p:nvSpPr>
+        <p:spPr>
+          <a:xfrm>
+            <a:off x="838200" y="1825625"/>
+            <a:ext cx="7414544" cy="4351338"/>
+          </a:xfrm>
+        </p:spPr>
+        <p:txBody>
+          <a:bodyPr>
+            <a:normAutofit fontScale="92500" lnSpcReduction="20000"/>
+          </a:bodyPr>
+          <a:lstStyle/>
+          <a:p>
+            <a:pPr marL="285750" indent="-285750">
+              <a:buFont typeface="Arial" panose="020B0604020202020204" pitchFamily="34" charset="0"/>
+              <a:buChar char="•"/>
+            </a:pPr>
+            <a:r>
+              <a:rPr lang="en-US" dirty="0"/>
+              <a:t>Starts by </a:t>
+            </a:r>
+            <a:r>
+              <a:rPr lang="en-US" b="1" i="1" u="sng" dirty="0" err="1"/>
+              <a:t>syscalls</a:t>
+            </a:r>
+            <a:r>
+              <a:rPr lang="en-US" b="1" dirty="0"/>
+              <a:t> </a:t>
+            </a:r>
+            <a:r>
+              <a:rPr lang="en-US" dirty="0"/>
+              <a:t>executed by the parent process.</a:t>
+            </a:r>
+          </a:p>
+          <a:p>
+            <a:pPr marL="285750" indent="-285750">
+              <a:buFont typeface="Arial" panose="020B0604020202020204" pitchFamily="34" charset="0"/>
+              <a:buChar char="•"/>
+            </a:pPr>
+            <a:r>
+              <a:rPr lang="en-US" dirty="0"/>
+              <a:t>Bound to a </a:t>
+            </a:r>
+            <a:r>
+              <a:rPr lang="en-US" b="1" i="1" dirty="0"/>
+              <a:t>set of </a:t>
+            </a:r>
+            <a:r>
+              <a:rPr lang="en-US" b="1" i="1" dirty="0" err="1"/>
+              <a:t>cpus</a:t>
+            </a:r>
+            <a:r>
+              <a:rPr lang="en-US" dirty="0"/>
+              <a:t> (typically all) unless some are masked out. And has a ”nice” value describing scheduling priority*</a:t>
+            </a:r>
+          </a:p>
+          <a:p>
+            <a:pPr marL="285750" indent="-285750">
+              <a:buFont typeface="Arial" panose="020B0604020202020204" pitchFamily="34" charset="0"/>
+              <a:buChar char="•"/>
+            </a:pPr>
+            <a:r>
+              <a:rPr lang="en-US" dirty="0"/>
+              <a:t>Runs as the </a:t>
+            </a:r>
+            <a:r>
+              <a:rPr lang="en-US" b="1" i="1" dirty="0"/>
+              <a:t>user who started </a:t>
+            </a:r>
+            <a:r>
+              <a:rPr lang="en-US" dirty="0"/>
+              <a:t>it (or the one started its parent) or the </a:t>
+            </a:r>
+            <a:r>
+              <a:rPr lang="en-US" b="1" dirty="0"/>
+              <a:t>user who created the executable (</a:t>
+            </a:r>
+            <a:r>
+              <a:rPr lang="en-US" b="1" dirty="0" err="1"/>
+              <a:t>setuid</a:t>
+            </a:r>
+            <a:r>
+              <a:rPr lang="en-US" b="1" dirty="0"/>
+              <a:t>(2) </a:t>
+            </a:r>
+            <a:r>
+              <a:rPr lang="en-US" b="1" dirty="0" err="1"/>
+              <a:t>setgid</a:t>
+            </a:r>
+            <a:r>
+              <a:rPr lang="en-US" b="1" dirty="0"/>
+              <a:t>(2))</a:t>
+            </a:r>
+            <a:r>
+              <a:rPr lang="en-US" dirty="0"/>
+              <a:t>.</a:t>
+            </a:r>
+          </a:p>
+          <a:p>
+            <a:pPr marL="285750" indent="-285750">
+              <a:buFont typeface="Arial" panose="020B0604020202020204" pitchFamily="34" charset="0"/>
+              <a:buChar char="•"/>
+            </a:pPr>
+            <a:r>
+              <a:rPr lang="en-US" dirty="0"/>
+              <a:t>Automatically gets:</a:t>
+            </a:r>
+          </a:p>
+          <a:p>
+            <a:pPr marL="742950" lvl="1" indent="-285750">
+              <a:buFont typeface="Arial" panose="020B0604020202020204" pitchFamily="34" charset="0"/>
+              <a:buChar char="•"/>
+            </a:pPr>
+            <a:r>
+              <a:rPr lang="en-US" b="1" dirty="0"/>
+              <a:t>FDs:</a:t>
+            </a:r>
+            <a:r>
+              <a:rPr lang="en-US" dirty="0"/>
+              <a:t> stdin, </a:t>
+            </a:r>
+            <a:r>
+              <a:rPr lang="en-US" dirty="0" err="1"/>
+              <a:t>stdout</a:t>
+            </a:r>
+            <a:r>
+              <a:rPr lang="en-US" dirty="0"/>
+              <a:t>, stderr</a:t>
+            </a:r>
+          </a:p>
+          <a:p>
+            <a:pPr marL="742950" lvl="1" indent="-285750">
+              <a:buFont typeface="Arial" panose="020B0604020202020204" pitchFamily="34" charset="0"/>
+              <a:buChar char="•"/>
+            </a:pPr>
+            <a:r>
+              <a:rPr lang="en-US" dirty="0"/>
+              <a:t>TTY</a:t>
+            </a:r>
+          </a:p>
+          <a:p>
+            <a:pPr marL="285750" indent="-285750">
+              <a:buFont typeface="Arial" panose="020B0604020202020204" pitchFamily="34" charset="0"/>
+              <a:buChar char="•"/>
+            </a:pPr>
+            <a:r>
+              <a:rPr lang="en-US" dirty="0"/>
+              <a:t>A </a:t>
+            </a:r>
+            <a:r>
+              <a:rPr lang="en-US" b="1" dirty="0"/>
+              <a:t>unique memory address</a:t>
+            </a:r>
+            <a:r>
+              <a:rPr lang="en-US" dirty="0"/>
+              <a:t> space (aka proc mem-map, not to be confused with </a:t>
+            </a:r>
+            <a:r>
+              <a:rPr lang="en-US" b="1" dirty="0" err="1"/>
+              <a:t>mmap</a:t>
+            </a:r>
+            <a:r>
+              <a:rPr lang="en-US" b="1" dirty="0"/>
+              <a:t>(2)</a:t>
+            </a:r>
+            <a:r>
+              <a:rPr lang="en-US" dirty="0"/>
+              <a:t>).</a:t>
+            </a:r>
+          </a:p>
+        </p:txBody>
+      </p:sp>
+      <p:sp>
+        <p:nvSpPr>
+          <p:cNvPr id="4" name="Rounded Rectangle 3">
+            <a:extLst>
+              <a:ext uri="{FF2B5EF4-FFF2-40B4-BE49-F238E27FC236}">
+                <a16:creationId xmlns:a16="http://schemas.microsoft.com/office/drawing/2014/main" id="{0A5E5CC6-C40A-D74A-9E9C-A64A5703BDA7}"/>
+              </a:ext>
+            </a:extLst>
+          </p:cNvPr>
+          <p:cNvSpPr/>
+          <p:nvPr/>
+        </p:nvSpPr>
+        <p:spPr>
+          <a:xfrm>
+            <a:off x="9156834" y="752354"/>
+            <a:ext cx="2534856" cy="717630"/>
+          </a:xfrm>
+          <a:prstGeom prst="roundRect">
+            <a:avLst>
+              <a:gd name="adj" fmla="val 5377"/>
+            </a:avLst>
+          </a:prstGeom>
+        </p:spPr>
+        <p:style>
+          <a:lnRef idx="2">
+            <a:schemeClr val="accent1">
+              <a:shade val="50000"/>
+            </a:schemeClr>
+          </a:lnRef>
+          <a:fillRef idx="1">
+            <a:schemeClr val="accent1"/>
+          </a:fillRef>
+          <a:effectRef idx="0">
+            <a:schemeClr val="accent1"/>
+          </a:effectRef>
+          <a:fontRef idx="minor">
+            <a:schemeClr val="lt1"/>
+          </a:fontRef>
+        </p:style>
+        <p:txBody>
+          <a:bodyPr rtlCol="0" anchor="ctr"/>
+          <a:lstStyle/>
+          <a:p>
+            <a:pPr algn="ctr"/>
+            <a:r>
+              <a:rPr lang="en-US" dirty="0"/>
+              <a:t>Parent</a:t>
+            </a:r>
+          </a:p>
+        </p:txBody>
+      </p:sp>
+      <p:sp>
+        <p:nvSpPr>
+          <p:cNvPr id="5" name="Rounded Rectangle 4">
+            <a:extLst>
+              <a:ext uri="{FF2B5EF4-FFF2-40B4-BE49-F238E27FC236}">
+                <a16:creationId xmlns:a16="http://schemas.microsoft.com/office/drawing/2014/main" id="{BD9F6841-4E8D-6E4B-9C2B-759AAE94F3F4}"/>
+              </a:ext>
+            </a:extLst>
+          </p:cNvPr>
+          <p:cNvSpPr/>
+          <p:nvPr/>
+        </p:nvSpPr>
+        <p:spPr>
+          <a:xfrm>
+            <a:off x="9156834" y="2853159"/>
+            <a:ext cx="2534856" cy="717630"/>
+          </a:xfrm>
+          <a:prstGeom prst="roundRect">
+            <a:avLst>
+              <a:gd name="adj" fmla="val 5377"/>
+            </a:avLst>
+          </a:prstGeom>
+        </p:spPr>
+        <p:style>
+          <a:lnRef idx="2">
+            <a:schemeClr val="accent1">
+              <a:shade val="50000"/>
+            </a:schemeClr>
+          </a:lnRef>
+          <a:fillRef idx="1">
+            <a:schemeClr val="accent1"/>
+          </a:fillRef>
+          <a:effectRef idx="0">
+            <a:schemeClr val="accent1"/>
+          </a:effectRef>
+          <a:fontRef idx="minor">
+            <a:schemeClr val="lt1"/>
+          </a:fontRef>
+        </p:style>
+        <p:txBody>
+          <a:bodyPr rtlCol="0" anchor="ctr"/>
+          <a:lstStyle/>
+          <a:p>
+            <a:pPr algn="ctr"/>
+            <a:r>
+              <a:rPr lang="en-US" dirty="0"/>
+              <a:t>Process</a:t>
+            </a:r>
+          </a:p>
+        </p:txBody>
+      </p:sp>
+      <p:cxnSp>
+        <p:nvCxnSpPr>
+          <p:cNvPr id="6" name="Straight Arrow Connector 5">
+            <a:extLst>
+              <a:ext uri="{FF2B5EF4-FFF2-40B4-BE49-F238E27FC236}">
+                <a16:creationId xmlns:a16="http://schemas.microsoft.com/office/drawing/2014/main" id="{F61CEAB0-6E6C-9D4E-AC93-D9EC35826B98}"/>
+              </a:ext>
+            </a:extLst>
+          </p:cNvPr>
+          <p:cNvCxnSpPr>
+            <a:stCxn id="4" idx="2"/>
+            <a:endCxn id="5" idx="0"/>
+          </p:cNvCxnSpPr>
+          <p:nvPr/>
+        </p:nvCxnSpPr>
+        <p:spPr>
+          <a:xfrm>
+            <a:off x="10424262" y="1469984"/>
+            <a:ext cx="0" cy="1383175"/>
+          </a:xfrm>
+          <a:prstGeom prst="straightConnector1">
+            <a:avLst/>
+          </a:prstGeom>
+          <a:ln w="28575">
+            <a:tailEnd type="triangle"/>
+          </a:ln>
+        </p:spPr>
+        <p:style>
+          <a:lnRef idx="1">
+            <a:schemeClr val="accent1"/>
+          </a:lnRef>
+          <a:fillRef idx="0">
+            <a:schemeClr val="accent1"/>
+          </a:fillRef>
+          <a:effectRef idx="0">
+            <a:schemeClr val="accent1"/>
+          </a:effectRef>
+          <a:fontRef idx="minor">
+            <a:schemeClr val="tx1"/>
+          </a:fontRef>
+        </p:style>
+      </p:cxnSp>
+      <p:sp>
+        <p:nvSpPr>
+          <p:cNvPr id="7" name="TextBox 6">
+            <a:extLst>
+              <a:ext uri="{FF2B5EF4-FFF2-40B4-BE49-F238E27FC236}">
+                <a16:creationId xmlns:a16="http://schemas.microsoft.com/office/drawing/2014/main" id="{3F90B440-580E-334C-9943-777C4DAC7D68}"/>
+              </a:ext>
+            </a:extLst>
+          </p:cNvPr>
+          <p:cNvSpPr txBox="1"/>
+          <p:nvPr/>
+        </p:nvSpPr>
+        <p:spPr>
+          <a:xfrm>
+            <a:off x="9387169" y="1825625"/>
+            <a:ext cx="806759" cy="830997"/>
+          </a:xfrm>
+          <a:prstGeom prst="rect">
+            <a:avLst/>
+          </a:prstGeom>
+          <a:noFill/>
+        </p:spPr>
+        <p:txBody>
+          <a:bodyPr wrap="none" rtlCol="0">
+            <a:spAutoFit/>
+          </a:bodyPr>
+          <a:lstStyle/>
+          <a:p>
+            <a:r>
+              <a:rPr lang="en-US" sz="1200" i="1" dirty="0"/>
+              <a:t>fork(2) </a:t>
+            </a:r>
+          </a:p>
+          <a:p>
+            <a:r>
+              <a:rPr lang="en-US" sz="1200" i="1" dirty="0"/>
+              <a:t>clone(2)</a:t>
+            </a:r>
+            <a:br>
+              <a:rPr lang="en-US" sz="1200" i="1" dirty="0"/>
+            </a:br>
+            <a:r>
+              <a:rPr lang="en-US" sz="1200" i="1" dirty="0"/>
+              <a:t>execve(2) </a:t>
+            </a:r>
+          </a:p>
+          <a:p>
+            <a:r>
+              <a:rPr lang="en-US" sz="1200" i="1" dirty="0"/>
+              <a:t>exec(2)</a:t>
+            </a:r>
+          </a:p>
+        </p:txBody>
+      </p:sp>
+      <p:sp>
+        <p:nvSpPr>
+          <p:cNvPr id="8" name="TextBox 7">
+            <a:extLst>
+              <a:ext uri="{FF2B5EF4-FFF2-40B4-BE49-F238E27FC236}">
+                <a16:creationId xmlns:a16="http://schemas.microsoft.com/office/drawing/2014/main" id="{6101D7F4-B672-AF4B-AB98-CFD60ED56864}"/>
+              </a:ext>
+            </a:extLst>
+          </p:cNvPr>
+          <p:cNvSpPr txBox="1"/>
+          <p:nvPr/>
+        </p:nvSpPr>
+        <p:spPr>
+          <a:xfrm>
+            <a:off x="3055716" y="636608"/>
+            <a:ext cx="184731" cy="369332"/>
+          </a:xfrm>
+          <a:prstGeom prst="rect">
+            <a:avLst/>
+          </a:prstGeom>
+          <a:noFill/>
+        </p:spPr>
+        <p:txBody>
+          <a:bodyPr wrap="none" rtlCol="0">
+            <a:spAutoFit/>
+          </a:bodyPr>
+          <a:lstStyle/>
+          <a:p>
+            <a:endParaRPr lang="en-US" dirty="0"/>
+          </a:p>
+        </p:txBody>
+      </p:sp>
+    </p:spTree>
+    <p:extLst>
+      <p:ext uri="{BB962C8B-B14F-4D97-AF65-F5344CB8AC3E}">
+        <p14:creationId xmlns:p14="http://schemas.microsoft.com/office/powerpoint/2010/main" val="3357472567"/>
       </p:ext>
     </p:extLst>
   </p:cSld>

</xml_diff>